<commit_message>
10 repetitions per model added
</commit_message>
<xml_diff>
--- a/outputs/summary.pptx
+++ b/outputs/summary.pptx
@@ -5,17 +5,23 @@
     <p:sldMasterId id="2147483648" r:id="rId1"/>
   </p:sldMasterIdLst>
   <p:sldIdLst>
-    <p:sldId id="256" r:id="rId2"/>
-    <p:sldId id="266" r:id="rId3"/>
+    <p:sldId id="267" r:id="rId2"/>
+    <p:sldId id="256" r:id="rId3"/>
     <p:sldId id="259" r:id="rId4"/>
     <p:sldId id="258" r:id="rId5"/>
     <p:sldId id="257" r:id="rId6"/>
     <p:sldId id="260" r:id="rId7"/>
     <p:sldId id="261" r:id="rId8"/>
     <p:sldId id="262" r:id="rId9"/>
-    <p:sldId id="263" r:id="rId10"/>
-    <p:sldId id="264" r:id="rId11"/>
-    <p:sldId id="265" r:id="rId12"/>
+    <p:sldId id="266" r:id="rId10"/>
+    <p:sldId id="268" r:id="rId11"/>
+    <p:sldId id="275" r:id="rId12"/>
+    <p:sldId id="276" r:id="rId13"/>
+    <p:sldId id="277" r:id="rId14"/>
+    <p:sldId id="271" r:id="rId15"/>
+    <p:sldId id="278" r:id="rId16"/>
+    <p:sldId id="263" r:id="rId17"/>
+    <p:sldId id="274" r:id="rId18"/>
   </p:sldIdLst>
   <p:sldSz cx="12192000" cy="6858000"/>
   <p:notesSz cx="6858000" cy="9144000"/>
@@ -114,7 +120,654 @@
       </a:defRPr>
     </a:lvl9pPr>
   </p:defaultTextStyle>
+  <p:extLst>
+    <p:ext uri="{EFAFB233-063F-42B5-8137-9DF3F51BA10A}">
+      <p15:sldGuideLst xmlns:p15="http://schemas.microsoft.com/office/powerpoint/2012/main"/>
+    </p:ext>
+  </p:extLst>
 </p:presentation>
+</file>
+
+<file path=ppt/revisionInfo.xml><?xml version="1.0" encoding="utf-8"?>
+<p1510:revInfo xmlns:a="http://schemas.openxmlformats.org/drawingml/2006/main" xmlns:r="http://schemas.openxmlformats.org/officeDocument/2006/relationships" xmlns:p1510="http://schemas.microsoft.com/office/powerpoint/2015/10/main">
+  <p1510:revLst>
+    <p1510:client id="{AD861AA3-1B13-4595-854C-9F6C151E35BA}" v="43" dt="2022-11-07T10:25:03.469"/>
+  </p1510:revLst>
+</p1510:revInfo>
+</file>
+
+<file path=ppt/changesInfos/changesInfo1.xml><?xml version="1.0" encoding="utf-8"?>
+<pc:chgInfo xmlns:a="http://schemas.openxmlformats.org/drawingml/2006/main" xmlns:r="http://schemas.openxmlformats.org/officeDocument/2006/relationships" xmlns:ac="http://schemas.microsoft.com/office/drawing/2013/main/command" xmlns:pc="http://schemas.microsoft.com/office/powerpoint/2013/main/command">
+  <pc:docChgLst>
+    <pc:chgData name="Jauregui Beso, Jara" userId="545a1999-fc67-42e4-bc6e-07b57f946614" providerId="ADAL" clId="{AD861AA3-1B13-4595-854C-9F6C151E35BA}"/>
+    <pc:docChg chg="undo custSel addSld delSld modSld sldOrd">
+      <pc:chgData name="Jauregui Beso, Jara" userId="545a1999-fc67-42e4-bc6e-07b57f946614" providerId="ADAL" clId="{AD861AA3-1B13-4595-854C-9F6C151E35BA}" dt="2022-11-07T10:26:05.400" v="1990"/>
+      <pc:docMkLst>
+        <pc:docMk/>
+      </pc:docMkLst>
+      <pc:sldChg chg="addSp delSp modSp mod">
+        <pc:chgData name="Jauregui Beso, Jara" userId="545a1999-fc67-42e4-bc6e-07b57f946614" providerId="ADAL" clId="{AD861AA3-1B13-4595-854C-9F6C151E35BA}" dt="2022-11-03T09:06:42.857" v="17" actId="1076"/>
+        <pc:sldMkLst>
+          <pc:docMk/>
+          <pc:sldMk cId="4221457052" sldId="256"/>
+        </pc:sldMkLst>
+        <pc:spChg chg="add mod">
+          <ac:chgData name="Jauregui Beso, Jara" userId="545a1999-fc67-42e4-bc6e-07b57f946614" providerId="ADAL" clId="{AD861AA3-1B13-4595-854C-9F6C151E35BA}" dt="2022-11-03T09:06:12.708" v="8" actId="1076"/>
+          <ac:spMkLst>
+            <pc:docMk/>
+            <pc:sldMk cId="4221457052" sldId="256"/>
+            <ac:spMk id="4" creationId="{97D056CA-03C2-0D6C-64E1-9D18DD871326}"/>
+          </ac:spMkLst>
+        </pc:spChg>
+        <pc:spChg chg="add mod">
+          <ac:chgData name="Jauregui Beso, Jara" userId="545a1999-fc67-42e4-bc6e-07b57f946614" providerId="ADAL" clId="{AD861AA3-1B13-4595-854C-9F6C151E35BA}" dt="2022-11-03T09:06:20.687" v="10" actId="1076"/>
+          <ac:spMkLst>
+            <pc:docMk/>
+            <pc:sldMk cId="4221457052" sldId="256"/>
+            <ac:spMk id="5" creationId="{9D55DCB2-0A03-0B6D-5AC8-03FCB27CC864}"/>
+          </ac:spMkLst>
+        </pc:spChg>
+        <pc:spChg chg="add mod">
+          <ac:chgData name="Jauregui Beso, Jara" userId="545a1999-fc67-42e4-bc6e-07b57f946614" providerId="ADAL" clId="{AD861AA3-1B13-4595-854C-9F6C151E35BA}" dt="2022-11-03T09:06:42.857" v="17" actId="1076"/>
+          <ac:spMkLst>
+            <pc:docMk/>
+            <pc:sldMk cId="4221457052" sldId="256"/>
+            <ac:spMk id="6" creationId="{23E78D1C-1316-2D4D-336C-12FE82AC251C}"/>
+          </ac:spMkLst>
+        </pc:spChg>
+        <pc:picChg chg="add mod">
+          <ac:chgData name="Jauregui Beso, Jara" userId="545a1999-fc67-42e4-bc6e-07b57f946614" providerId="ADAL" clId="{AD861AA3-1B13-4595-854C-9F6C151E35BA}" dt="2022-11-03T09:06:35.903" v="16" actId="1076"/>
+          <ac:picMkLst>
+            <pc:docMk/>
+            <pc:sldMk cId="4221457052" sldId="256"/>
+            <ac:picMk id="3" creationId="{FB2D6238-2909-7820-887C-E8F96409B54B}"/>
+          </ac:picMkLst>
+        </pc:picChg>
+        <pc:picChg chg="del">
+          <ac:chgData name="Jauregui Beso, Jara" userId="545a1999-fc67-42e4-bc6e-07b57f946614" providerId="ADAL" clId="{AD861AA3-1B13-4595-854C-9F6C151E35BA}" dt="2022-11-03T09:05:41.294" v="0" actId="478"/>
+          <ac:picMkLst>
+            <pc:docMk/>
+            <pc:sldMk cId="4221457052" sldId="256"/>
+            <ac:picMk id="9" creationId="{0D92446F-FA1E-5BF7-5462-E7CE30964EE0}"/>
+          </ac:picMkLst>
+        </pc:picChg>
+      </pc:sldChg>
+      <pc:sldChg chg="modSp mod">
+        <pc:chgData name="Jauregui Beso, Jara" userId="545a1999-fc67-42e4-bc6e-07b57f946614" providerId="ADAL" clId="{AD861AA3-1B13-4595-854C-9F6C151E35BA}" dt="2022-11-03T09:16:43.201" v="310" actId="20577"/>
+        <pc:sldMkLst>
+          <pc:docMk/>
+          <pc:sldMk cId="3489585339" sldId="257"/>
+        </pc:sldMkLst>
+        <pc:spChg chg="mod">
+          <ac:chgData name="Jauregui Beso, Jara" userId="545a1999-fc67-42e4-bc6e-07b57f946614" providerId="ADAL" clId="{AD861AA3-1B13-4595-854C-9F6C151E35BA}" dt="2022-11-03T09:16:43.201" v="310" actId="20577"/>
+          <ac:spMkLst>
+            <pc:docMk/>
+            <pc:sldMk cId="3489585339" sldId="257"/>
+            <ac:spMk id="15" creationId="{1E076FE3-A983-0F19-D08D-EAE6513ED872}"/>
+          </ac:spMkLst>
+        </pc:spChg>
+      </pc:sldChg>
+      <pc:sldChg chg="modSp mod">
+        <pc:chgData name="Jauregui Beso, Jara" userId="545a1999-fc67-42e4-bc6e-07b57f946614" providerId="ADAL" clId="{AD861AA3-1B13-4595-854C-9F6C151E35BA}" dt="2022-11-03T09:14:00.688" v="304" actId="27636"/>
+        <pc:sldMkLst>
+          <pc:docMk/>
+          <pc:sldMk cId="2436105536" sldId="259"/>
+        </pc:sldMkLst>
+        <pc:spChg chg="mod">
+          <ac:chgData name="Jauregui Beso, Jara" userId="545a1999-fc67-42e4-bc6e-07b57f946614" providerId="ADAL" clId="{AD861AA3-1B13-4595-854C-9F6C151E35BA}" dt="2022-11-03T09:14:00.688" v="304" actId="27636"/>
+          <ac:spMkLst>
+            <pc:docMk/>
+            <pc:sldMk cId="2436105536" sldId="259"/>
+            <ac:spMk id="3" creationId="{FD2D1AC9-4034-52F2-6924-A64C8BF6C876}"/>
+          </ac:spMkLst>
+        </pc:spChg>
+      </pc:sldChg>
+      <pc:sldChg chg="addSp delSp modSp mod">
+        <pc:chgData name="Jauregui Beso, Jara" userId="545a1999-fc67-42e4-bc6e-07b57f946614" providerId="ADAL" clId="{AD861AA3-1B13-4595-854C-9F6C151E35BA}" dt="2022-11-07T10:12:59.856" v="1518" actId="20577"/>
+        <pc:sldMkLst>
+          <pc:docMk/>
+          <pc:sldMk cId="1422733971" sldId="263"/>
+        </pc:sldMkLst>
+        <pc:spChg chg="add mod">
+          <ac:chgData name="Jauregui Beso, Jara" userId="545a1999-fc67-42e4-bc6e-07b57f946614" providerId="ADAL" clId="{AD861AA3-1B13-4595-854C-9F6C151E35BA}" dt="2022-11-07T10:12:59.856" v="1518" actId="20577"/>
+          <ac:spMkLst>
+            <pc:docMk/>
+            <pc:sldMk cId="1422733971" sldId="263"/>
+            <ac:spMk id="6" creationId="{52A5B92E-70CA-DAC2-485F-85B149E59375}"/>
+          </ac:spMkLst>
+        </pc:spChg>
+        <pc:spChg chg="del">
+          <ac:chgData name="Jauregui Beso, Jara" userId="545a1999-fc67-42e4-bc6e-07b57f946614" providerId="ADAL" clId="{AD861AA3-1B13-4595-854C-9F6C151E35BA}" dt="2022-11-03T11:46:13.175" v="1405" actId="478"/>
+          <ac:spMkLst>
+            <pc:docMk/>
+            <pc:sldMk cId="1422733971" sldId="263"/>
+            <ac:spMk id="11" creationId="{260FD1F0-D4F9-64B8-21EE-35A657542C55}"/>
+          </ac:spMkLst>
+        </pc:spChg>
+        <pc:spChg chg="del">
+          <ac:chgData name="Jauregui Beso, Jara" userId="545a1999-fc67-42e4-bc6e-07b57f946614" providerId="ADAL" clId="{AD861AA3-1B13-4595-854C-9F6C151E35BA}" dt="2022-11-03T11:41:07.163" v="1398" actId="478"/>
+          <ac:spMkLst>
+            <pc:docMk/>
+            <pc:sldMk cId="1422733971" sldId="263"/>
+            <ac:spMk id="15" creationId="{4AC1055D-C3A9-1E1F-3930-E7CF498C7519}"/>
+          </ac:spMkLst>
+        </pc:spChg>
+        <pc:picChg chg="add mod ord">
+          <ac:chgData name="Jauregui Beso, Jara" userId="545a1999-fc67-42e4-bc6e-07b57f946614" providerId="ADAL" clId="{AD861AA3-1B13-4595-854C-9F6C151E35BA}" dt="2022-11-03T11:46:34.463" v="1410" actId="1076"/>
+          <ac:picMkLst>
+            <pc:docMk/>
+            <pc:sldMk cId="1422733971" sldId="263"/>
+            <ac:picMk id="3" creationId="{04988A35-2B1C-DA5E-D94A-F20B88D17605}"/>
+          </ac:picMkLst>
+        </pc:picChg>
+        <pc:picChg chg="add del mod">
+          <ac:chgData name="Jauregui Beso, Jara" userId="545a1999-fc67-42e4-bc6e-07b57f946614" providerId="ADAL" clId="{AD861AA3-1B13-4595-854C-9F6C151E35BA}" dt="2022-11-03T11:46:23.238" v="1408"/>
+          <ac:picMkLst>
+            <pc:docMk/>
+            <pc:sldMk cId="1422733971" sldId="263"/>
+            <ac:picMk id="5" creationId="{3A50181D-AB66-C314-CC10-EAC27A5704D3}"/>
+          </ac:picMkLst>
+        </pc:picChg>
+        <pc:picChg chg="del">
+          <ac:chgData name="Jauregui Beso, Jara" userId="545a1999-fc67-42e4-bc6e-07b57f946614" providerId="ADAL" clId="{AD861AA3-1B13-4595-854C-9F6C151E35BA}" dt="2022-11-03T11:41:04.343" v="1396" actId="478"/>
+          <ac:picMkLst>
+            <pc:docMk/>
+            <pc:sldMk cId="1422733971" sldId="263"/>
+            <ac:picMk id="8" creationId="{22DB82C1-AB4C-C75A-4F6A-4867AD100141}"/>
+          </ac:picMkLst>
+        </pc:picChg>
+        <pc:picChg chg="del">
+          <ac:chgData name="Jauregui Beso, Jara" userId="545a1999-fc67-42e4-bc6e-07b57f946614" providerId="ADAL" clId="{AD861AA3-1B13-4595-854C-9F6C151E35BA}" dt="2022-11-03T11:41:04.944" v="1397" actId="478"/>
+          <ac:picMkLst>
+            <pc:docMk/>
+            <pc:sldMk cId="1422733971" sldId="263"/>
+            <ac:picMk id="14" creationId="{C79C25F6-0623-2931-B39E-0CB52372A240}"/>
+          </ac:picMkLst>
+        </pc:picChg>
+      </pc:sldChg>
+      <pc:sldChg chg="del">
+        <pc:chgData name="Jauregui Beso, Jara" userId="545a1999-fc67-42e4-bc6e-07b57f946614" providerId="ADAL" clId="{AD861AA3-1B13-4595-854C-9F6C151E35BA}" dt="2022-11-07T10:11:17.517" v="1454" actId="47"/>
+        <pc:sldMkLst>
+          <pc:docMk/>
+          <pc:sldMk cId="3303346691" sldId="264"/>
+        </pc:sldMkLst>
+      </pc:sldChg>
+      <pc:sldChg chg="del">
+        <pc:chgData name="Jauregui Beso, Jara" userId="545a1999-fc67-42e4-bc6e-07b57f946614" providerId="ADAL" clId="{AD861AA3-1B13-4595-854C-9F6C151E35BA}" dt="2022-11-07T10:11:18.275" v="1455" actId="47"/>
+        <pc:sldMkLst>
+          <pc:docMk/>
+          <pc:sldMk cId="2852343294" sldId="265"/>
+        </pc:sldMkLst>
+      </pc:sldChg>
+      <pc:sldChg chg="del">
+        <pc:chgData name="Jauregui Beso, Jara" userId="545a1999-fc67-42e4-bc6e-07b57f946614" providerId="ADAL" clId="{AD861AA3-1B13-4595-854C-9F6C151E35BA}" dt="2022-11-03T09:06:52.874" v="18" actId="47"/>
+        <pc:sldMkLst>
+          <pc:docMk/>
+          <pc:sldMk cId="1629727062" sldId="266"/>
+        </pc:sldMkLst>
+      </pc:sldChg>
+      <pc:sldChg chg="addSp delSp modSp new mod ord">
+        <pc:chgData name="Jauregui Beso, Jara" userId="545a1999-fc67-42e4-bc6e-07b57f946614" providerId="ADAL" clId="{AD861AA3-1B13-4595-854C-9F6C151E35BA}" dt="2022-11-03T11:19:04.257" v="1263" actId="27636"/>
+        <pc:sldMkLst>
+          <pc:docMk/>
+          <pc:sldMk cId="4097966587" sldId="266"/>
+        </pc:sldMkLst>
+        <pc:spChg chg="mod">
+          <ac:chgData name="Jauregui Beso, Jara" userId="545a1999-fc67-42e4-bc6e-07b57f946614" providerId="ADAL" clId="{AD861AA3-1B13-4595-854C-9F6C151E35BA}" dt="2022-11-03T10:16:05.154" v="456" actId="20577"/>
+          <ac:spMkLst>
+            <pc:docMk/>
+            <pc:sldMk cId="4097966587" sldId="266"/>
+            <ac:spMk id="2" creationId="{C40AFC7F-5EA5-87CD-EEF2-6BDE715C738D}"/>
+          </ac:spMkLst>
+        </pc:spChg>
+        <pc:spChg chg="del">
+          <ac:chgData name="Jauregui Beso, Jara" userId="545a1999-fc67-42e4-bc6e-07b57f946614" providerId="ADAL" clId="{AD861AA3-1B13-4595-854C-9F6C151E35BA}" dt="2022-11-03T09:25:03.408" v="364" actId="478"/>
+          <ac:spMkLst>
+            <pc:docMk/>
+            <pc:sldMk cId="4097966587" sldId="266"/>
+            <ac:spMk id="3" creationId="{1B417871-F10B-F092-047B-47E7DE4A83E2}"/>
+          </ac:spMkLst>
+        </pc:spChg>
+        <pc:spChg chg="add mod">
+          <ac:chgData name="Jauregui Beso, Jara" userId="545a1999-fc67-42e4-bc6e-07b57f946614" providerId="ADAL" clId="{AD861AA3-1B13-4595-854C-9F6C151E35BA}" dt="2022-11-03T11:19:04.257" v="1263" actId="27636"/>
+          <ac:spMkLst>
+            <pc:docMk/>
+            <pc:sldMk cId="4097966587" sldId="266"/>
+            <ac:spMk id="4" creationId="{169428E1-00B6-1985-2387-D774DAA298E8}"/>
+          </ac:spMkLst>
+        </pc:spChg>
+      </pc:sldChg>
+      <pc:sldChg chg="modSp new mod ord">
+        <pc:chgData name="Jauregui Beso, Jara" userId="545a1999-fc67-42e4-bc6e-07b57f946614" providerId="ADAL" clId="{AD861AA3-1B13-4595-854C-9F6C151E35BA}" dt="2022-11-03T10:15:10.802" v="427" actId="20577"/>
+        <pc:sldMkLst>
+          <pc:docMk/>
+          <pc:sldMk cId="941861617" sldId="267"/>
+        </pc:sldMkLst>
+        <pc:spChg chg="mod">
+          <ac:chgData name="Jauregui Beso, Jara" userId="545a1999-fc67-42e4-bc6e-07b57f946614" providerId="ADAL" clId="{AD861AA3-1B13-4595-854C-9F6C151E35BA}" dt="2022-11-03T10:15:10.802" v="427" actId="20577"/>
+          <ac:spMkLst>
+            <pc:docMk/>
+            <pc:sldMk cId="941861617" sldId="267"/>
+            <ac:spMk id="2" creationId="{BA5E6F36-563B-3818-761F-EAF303C2D618}"/>
+          </ac:spMkLst>
+        </pc:spChg>
+      </pc:sldChg>
+      <pc:sldChg chg="addSp delSp modSp add mod">
+        <pc:chgData name="Jauregui Beso, Jara" userId="545a1999-fc67-42e4-bc6e-07b57f946614" providerId="ADAL" clId="{AD861AA3-1B13-4595-854C-9F6C151E35BA}" dt="2022-11-07T10:19:20.491" v="1933" actId="20577"/>
+        <pc:sldMkLst>
+          <pc:docMk/>
+          <pc:sldMk cId="2327810541" sldId="268"/>
+        </pc:sldMkLst>
+        <pc:spChg chg="mod">
+          <ac:chgData name="Jauregui Beso, Jara" userId="545a1999-fc67-42e4-bc6e-07b57f946614" providerId="ADAL" clId="{AD861AA3-1B13-4595-854C-9F6C151E35BA}" dt="2022-11-03T10:46:27.869" v="1152" actId="1076"/>
+          <ac:spMkLst>
+            <pc:docMk/>
+            <pc:sldMk cId="2327810541" sldId="268"/>
+            <ac:spMk id="2" creationId="{C40AFC7F-5EA5-87CD-EEF2-6BDE715C738D}"/>
+          </ac:spMkLst>
+        </pc:spChg>
+        <pc:spChg chg="del">
+          <ac:chgData name="Jauregui Beso, Jara" userId="545a1999-fc67-42e4-bc6e-07b57f946614" providerId="ADAL" clId="{AD861AA3-1B13-4595-854C-9F6C151E35BA}" dt="2022-11-03T10:32:31.631" v="912" actId="478"/>
+          <ac:spMkLst>
+            <pc:docMk/>
+            <pc:sldMk cId="2327810541" sldId="268"/>
+            <ac:spMk id="4" creationId="{169428E1-00B6-1985-2387-D774DAA298E8}"/>
+          </ac:spMkLst>
+        </pc:spChg>
+        <pc:spChg chg="add del mod">
+          <ac:chgData name="Jauregui Beso, Jara" userId="545a1999-fc67-42e4-bc6e-07b57f946614" providerId="ADAL" clId="{AD861AA3-1B13-4595-854C-9F6C151E35BA}" dt="2022-11-03T10:32:48.634" v="945" actId="478"/>
+          <ac:spMkLst>
+            <pc:docMk/>
+            <pc:sldMk cId="2327810541" sldId="268"/>
+            <ac:spMk id="5" creationId="{9F7B7170-F7D0-5FFF-70F6-033DE1D86293}"/>
+          </ac:spMkLst>
+        </pc:spChg>
+        <pc:spChg chg="add mod">
+          <ac:chgData name="Jauregui Beso, Jara" userId="545a1999-fc67-42e4-bc6e-07b57f946614" providerId="ADAL" clId="{AD861AA3-1B13-4595-854C-9F6C151E35BA}" dt="2022-11-07T10:19:20.491" v="1933" actId="20577"/>
+          <ac:spMkLst>
+            <pc:docMk/>
+            <pc:sldMk cId="2327810541" sldId="268"/>
+            <ac:spMk id="11" creationId="{99BAED0E-81C2-C67C-9F14-4EB2793F82AE}"/>
+          </ac:spMkLst>
+        </pc:spChg>
+        <pc:picChg chg="add del mod ord modCrop">
+          <ac:chgData name="Jauregui Beso, Jara" userId="545a1999-fc67-42e4-bc6e-07b57f946614" providerId="ADAL" clId="{AD861AA3-1B13-4595-854C-9F6C151E35BA}" dt="2022-11-03T10:39:23.706" v="958" actId="478"/>
+          <ac:picMkLst>
+            <pc:docMk/>
+            <pc:sldMk cId="2327810541" sldId="268"/>
+            <ac:picMk id="7" creationId="{BE5A5004-DBDB-C39F-59CF-220935FD8EB3}"/>
+          </ac:picMkLst>
+        </pc:picChg>
+        <pc:picChg chg="add del mod ord modCrop">
+          <ac:chgData name="Jauregui Beso, Jara" userId="545a1999-fc67-42e4-bc6e-07b57f946614" providerId="ADAL" clId="{AD861AA3-1B13-4595-854C-9F6C151E35BA}" dt="2022-11-07T10:14:29.945" v="1595" actId="478"/>
+          <ac:picMkLst>
+            <pc:docMk/>
+            <pc:sldMk cId="2327810541" sldId="268"/>
+            <ac:picMk id="9" creationId="{1DD11078-4070-8F15-DFC7-A11CEB60B02A}"/>
+          </ac:picMkLst>
+        </pc:picChg>
+        <pc:picChg chg="add del mod">
+          <ac:chgData name="Jauregui Beso, Jara" userId="545a1999-fc67-42e4-bc6e-07b57f946614" providerId="ADAL" clId="{AD861AA3-1B13-4595-854C-9F6C151E35BA}" dt="2022-11-03T10:40:21.855" v="971" actId="21"/>
+          <ac:picMkLst>
+            <pc:docMk/>
+            <pc:sldMk cId="2327810541" sldId="268"/>
+            <ac:picMk id="10" creationId="{85AA68ED-240A-CC04-13A2-14218446526B}"/>
+          </ac:picMkLst>
+        </pc:picChg>
+      </pc:sldChg>
+      <pc:sldChg chg="addSp delSp modSp add del mod">
+        <pc:chgData name="Jauregui Beso, Jara" userId="545a1999-fc67-42e4-bc6e-07b57f946614" providerId="ADAL" clId="{AD861AA3-1B13-4595-854C-9F6C151E35BA}" dt="2022-11-07T10:21:15.255" v="1949" actId="47"/>
+        <pc:sldMkLst>
+          <pc:docMk/>
+          <pc:sldMk cId="3799996995" sldId="269"/>
+        </pc:sldMkLst>
+        <pc:spChg chg="del">
+          <ac:chgData name="Jauregui Beso, Jara" userId="545a1999-fc67-42e4-bc6e-07b57f946614" providerId="ADAL" clId="{AD861AA3-1B13-4595-854C-9F6C151E35BA}" dt="2022-11-03T10:49:13.484" v="1170" actId="478"/>
+          <ac:spMkLst>
+            <pc:docMk/>
+            <pc:sldMk cId="3799996995" sldId="269"/>
+            <ac:spMk id="2" creationId="{C40AFC7F-5EA5-87CD-EEF2-6BDE715C738D}"/>
+          </ac:spMkLst>
+        </pc:spChg>
+        <pc:spChg chg="add mod">
+          <ac:chgData name="Jauregui Beso, Jara" userId="545a1999-fc67-42e4-bc6e-07b57f946614" providerId="ADAL" clId="{AD861AA3-1B13-4595-854C-9F6C151E35BA}" dt="2022-11-03T10:57:25.124" v="1216" actId="14100"/>
+          <ac:spMkLst>
+            <pc:docMk/>
+            <pc:sldMk cId="3799996995" sldId="269"/>
+            <ac:spMk id="4" creationId="{20E6FDB1-60BC-85B0-3EA3-09433FA21E59}"/>
+          </ac:spMkLst>
+        </pc:spChg>
+        <pc:spChg chg="add del mod">
+          <ac:chgData name="Jauregui Beso, Jara" userId="545a1999-fc67-42e4-bc6e-07b57f946614" providerId="ADAL" clId="{AD861AA3-1B13-4595-854C-9F6C151E35BA}" dt="2022-11-03T10:49:16.864" v="1172" actId="478"/>
+          <ac:spMkLst>
+            <pc:docMk/>
+            <pc:sldMk cId="3799996995" sldId="269"/>
+            <ac:spMk id="6" creationId="{9843D951-5FBC-CF28-354A-A8D1855A2479}"/>
+          </ac:spMkLst>
+        </pc:spChg>
+        <pc:spChg chg="add mod">
+          <ac:chgData name="Jauregui Beso, Jara" userId="545a1999-fc67-42e4-bc6e-07b57f946614" providerId="ADAL" clId="{AD861AA3-1B13-4595-854C-9F6C151E35BA}" dt="2022-11-03T10:49:13.750" v="1171"/>
+          <ac:spMkLst>
+            <pc:docMk/>
+            <pc:sldMk cId="3799996995" sldId="269"/>
+            <ac:spMk id="8" creationId="{1A2E2F0C-CB54-5BFD-916D-FC7EB09EA889}"/>
+          </ac:spMkLst>
+        </pc:spChg>
+        <pc:spChg chg="add del mod">
+          <ac:chgData name="Jauregui Beso, Jara" userId="545a1999-fc67-42e4-bc6e-07b57f946614" providerId="ADAL" clId="{AD861AA3-1B13-4595-854C-9F6C151E35BA}" dt="2022-11-03T10:50:50.136" v="1174"/>
+          <ac:spMkLst>
+            <pc:docMk/>
+            <pc:sldMk cId="3799996995" sldId="269"/>
+            <ac:spMk id="9" creationId="{42027B54-F7A2-20F0-6F81-7EE83915AA80}"/>
+          </ac:spMkLst>
+        </pc:spChg>
+        <pc:picChg chg="add mod ord">
+          <ac:chgData name="Jauregui Beso, Jara" userId="545a1999-fc67-42e4-bc6e-07b57f946614" providerId="ADAL" clId="{AD861AA3-1B13-4595-854C-9F6C151E35BA}" dt="2022-11-03T10:47:08.009" v="1167" actId="1076"/>
+          <ac:picMkLst>
+            <pc:docMk/>
+            <pc:sldMk cId="3799996995" sldId="269"/>
+            <ac:picMk id="3" creationId="{CD872D1A-EDCD-FB5B-6288-6C5F12C69A3E}"/>
+          </ac:picMkLst>
+        </pc:picChg>
+        <pc:picChg chg="del">
+          <ac:chgData name="Jauregui Beso, Jara" userId="545a1999-fc67-42e4-bc6e-07b57f946614" providerId="ADAL" clId="{AD861AA3-1B13-4595-854C-9F6C151E35BA}" dt="2022-11-03T10:40:13.332" v="967" actId="21"/>
+          <ac:picMkLst>
+            <pc:docMk/>
+            <pc:sldMk cId="3799996995" sldId="269"/>
+            <ac:picMk id="7" creationId="{BE5A5004-DBDB-C39F-59CF-220935FD8EB3}"/>
+          </ac:picMkLst>
+        </pc:picChg>
+      </pc:sldChg>
+      <pc:sldChg chg="addSp delSp modSp add del mod">
+        <pc:chgData name="Jauregui Beso, Jara" userId="545a1999-fc67-42e4-bc6e-07b57f946614" providerId="ADAL" clId="{AD861AA3-1B13-4595-854C-9F6C151E35BA}" dt="2022-11-07T10:21:26.361" v="1950" actId="47"/>
+        <pc:sldMkLst>
+          <pc:docMk/>
+          <pc:sldMk cId="3878019074" sldId="270"/>
+        </pc:sldMkLst>
+        <pc:spChg chg="mod">
+          <ac:chgData name="Jauregui Beso, Jara" userId="545a1999-fc67-42e4-bc6e-07b57f946614" providerId="ADAL" clId="{AD861AA3-1B13-4595-854C-9F6C151E35BA}" dt="2022-11-03T11:01:35.265" v="1245" actId="20577"/>
+          <ac:spMkLst>
+            <pc:docMk/>
+            <pc:sldMk cId="3878019074" sldId="270"/>
+            <ac:spMk id="4" creationId="{20E6FDB1-60BC-85B0-3EA3-09433FA21E59}"/>
+          </ac:spMkLst>
+        </pc:spChg>
+        <pc:picChg chg="add del">
+          <ac:chgData name="Jauregui Beso, Jara" userId="545a1999-fc67-42e4-bc6e-07b57f946614" providerId="ADAL" clId="{AD861AA3-1B13-4595-854C-9F6C151E35BA}" dt="2022-11-03T11:01:04.617" v="1240" actId="478"/>
+          <ac:picMkLst>
+            <pc:docMk/>
+            <pc:sldMk cId="3878019074" sldId="270"/>
+            <ac:picMk id="3" creationId="{CD872D1A-EDCD-FB5B-6288-6C5F12C69A3E}"/>
+          </ac:picMkLst>
+        </pc:picChg>
+        <pc:picChg chg="add del mod">
+          <ac:chgData name="Jauregui Beso, Jara" userId="545a1999-fc67-42e4-bc6e-07b57f946614" providerId="ADAL" clId="{AD861AA3-1B13-4595-854C-9F6C151E35BA}" dt="2022-11-03T11:01:03.308" v="1239" actId="21"/>
+          <ac:picMkLst>
+            <pc:docMk/>
+            <pc:sldMk cId="3878019074" sldId="270"/>
+            <ac:picMk id="5" creationId="{9E9062FF-746F-0015-2393-33FA603598BA}"/>
+          </ac:picMkLst>
+        </pc:picChg>
+        <pc:picChg chg="add mod ord modCrop">
+          <ac:chgData name="Jauregui Beso, Jara" userId="545a1999-fc67-42e4-bc6e-07b57f946614" providerId="ADAL" clId="{AD861AA3-1B13-4595-854C-9F6C151E35BA}" dt="2022-11-03T11:01:28.563" v="1243" actId="167"/>
+          <ac:picMkLst>
+            <pc:docMk/>
+            <pc:sldMk cId="3878019074" sldId="270"/>
+            <ac:picMk id="6" creationId="{5E30E6D6-718B-14A4-81E4-D7ED454BEAAC}"/>
+          </ac:picMkLst>
+        </pc:picChg>
+      </pc:sldChg>
+      <pc:sldChg chg="addSp delSp modSp add mod">
+        <pc:chgData name="Jauregui Beso, Jara" userId="545a1999-fc67-42e4-bc6e-07b57f946614" providerId="ADAL" clId="{AD861AA3-1B13-4595-854C-9F6C151E35BA}" dt="2022-11-07T10:23:13.288" v="1980" actId="478"/>
+        <pc:sldMkLst>
+          <pc:docMk/>
+          <pc:sldMk cId="1696135541" sldId="271"/>
+        </pc:sldMkLst>
+        <pc:spChg chg="add del mod">
+          <ac:chgData name="Jauregui Beso, Jara" userId="545a1999-fc67-42e4-bc6e-07b57f946614" providerId="ADAL" clId="{AD861AA3-1B13-4595-854C-9F6C151E35BA}" dt="2022-11-07T10:23:13.288" v="1980" actId="478"/>
+          <ac:spMkLst>
+            <pc:docMk/>
+            <pc:sldMk cId="1696135541" sldId="271"/>
+            <ac:spMk id="3" creationId="{16B87924-C1A0-2F98-CD10-29730CE71F7F}"/>
+          </ac:spMkLst>
+        </pc:spChg>
+        <pc:spChg chg="mod">
+          <ac:chgData name="Jauregui Beso, Jara" userId="545a1999-fc67-42e4-bc6e-07b57f946614" providerId="ADAL" clId="{AD861AA3-1B13-4595-854C-9F6C151E35BA}" dt="2022-11-07T10:23:09.016" v="1979" actId="20577"/>
+          <ac:spMkLst>
+            <pc:docMk/>
+            <pc:sldMk cId="1696135541" sldId="271"/>
+            <ac:spMk id="4" creationId="{20E6FDB1-60BC-85B0-3EA3-09433FA21E59}"/>
+          </ac:spMkLst>
+        </pc:spChg>
+        <pc:spChg chg="mod">
+          <ac:chgData name="Jauregui Beso, Jara" userId="545a1999-fc67-42e4-bc6e-07b57f946614" providerId="ADAL" clId="{AD861AA3-1B13-4595-854C-9F6C151E35BA}" dt="2022-11-03T11:26:27.757" v="1292" actId="20577"/>
+          <ac:spMkLst>
+            <pc:docMk/>
+            <pc:sldMk cId="1696135541" sldId="271"/>
+            <ac:spMk id="8" creationId="{1A2E2F0C-CB54-5BFD-916D-FC7EB09EA889}"/>
+          </ac:spMkLst>
+        </pc:spChg>
+        <pc:picChg chg="add mod ord">
+          <ac:chgData name="Jauregui Beso, Jara" userId="545a1999-fc67-42e4-bc6e-07b57f946614" providerId="ADAL" clId="{AD861AA3-1B13-4595-854C-9F6C151E35BA}" dt="2022-11-03T11:27:48.443" v="1306" actId="14100"/>
+          <ac:picMkLst>
+            <pc:docMk/>
+            <pc:sldMk cId="1696135541" sldId="271"/>
+            <ac:picMk id="2" creationId="{C4473714-3127-14A0-B9C8-6C63849C423C}"/>
+          </ac:picMkLst>
+        </pc:picChg>
+        <pc:picChg chg="del">
+          <ac:chgData name="Jauregui Beso, Jara" userId="545a1999-fc67-42e4-bc6e-07b57f946614" providerId="ADAL" clId="{AD861AA3-1B13-4595-854C-9F6C151E35BA}" dt="2022-11-03T11:26:30.321" v="1293" actId="478"/>
+          <ac:picMkLst>
+            <pc:docMk/>
+            <pc:sldMk cId="1696135541" sldId="271"/>
+            <ac:picMk id="6" creationId="{5E30E6D6-718B-14A4-81E4-D7ED454BEAAC}"/>
+          </ac:picMkLst>
+        </pc:picChg>
+      </pc:sldChg>
+      <pc:sldChg chg="addSp delSp modSp add del mod">
+        <pc:chgData name="Jauregui Beso, Jara" userId="545a1999-fc67-42e4-bc6e-07b57f946614" providerId="ADAL" clId="{AD861AA3-1B13-4595-854C-9F6C151E35BA}" dt="2022-11-07T10:25:06.213" v="1982" actId="47"/>
+        <pc:sldMkLst>
+          <pc:docMk/>
+          <pc:sldMk cId="3560596556" sldId="272"/>
+        </pc:sldMkLst>
+        <pc:spChg chg="mod">
+          <ac:chgData name="Jauregui Beso, Jara" userId="545a1999-fc67-42e4-bc6e-07b57f946614" providerId="ADAL" clId="{AD861AA3-1B13-4595-854C-9F6C151E35BA}" dt="2022-11-03T11:33:15.698" v="1363" actId="20577"/>
+          <ac:spMkLst>
+            <pc:docMk/>
+            <pc:sldMk cId="3560596556" sldId="272"/>
+            <ac:spMk id="4" creationId="{20E6FDB1-60BC-85B0-3EA3-09433FA21E59}"/>
+          </ac:spMkLst>
+        </pc:spChg>
+        <pc:picChg chg="add del">
+          <ac:chgData name="Jauregui Beso, Jara" userId="545a1999-fc67-42e4-bc6e-07b57f946614" providerId="ADAL" clId="{AD861AA3-1B13-4595-854C-9F6C151E35BA}" dt="2022-11-03T11:30:33.929" v="1347" actId="478"/>
+          <ac:picMkLst>
+            <pc:docMk/>
+            <pc:sldMk cId="3560596556" sldId="272"/>
+            <ac:picMk id="2" creationId="{C4473714-3127-14A0-B9C8-6C63849C423C}"/>
+          </ac:picMkLst>
+        </pc:picChg>
+        <pc:picChg chg="add del mod">
+          <ac:chgData name="Jauregui Beso, Jara" userId="545a1999-fc67-42e4-bc6e-07b57f946614" providerId="ADAL" clId="{AD861AA3-1B13-4595-854C-9F6C151E35BA}" dt="2022-11-03T11:29:54.513" v="1338"/>
+          <ac:picMkLst>
+            <pc:docMk/>
+            <pc:sldMk cId="3560596556" sldId="272"/>
+            <ac:picMk id="3" creationId="{DA19072F-1FA1-9A84-90DA-3D7A15013477}"/>
+          </ac:picMkLst>
+        </pc:picChg>
+        <pc:picChg chg="add del mod">
+          <ac:chgData name="Jauregui Beso, Jara" userId="545a1999-fc67-42e4-bc6e-07b57f946614" providerId="ADAL" clId="{AD861AA3-1B13-4595-854C-9F6C151E35BA}" dt="2022-11-03T11:30:32.660" v="1346" actId="21"/>
+          <ac:picMkLst>
+            <pc:docMk/>
+            <pc:sldMk cId="3560596556" sldId="272"/>
+            <ac:picMk id="5" creationId="{65598C31-4B71-4C12-61A0-D2AAD7181D3A}"/>
+          </ac:picMkLst>
+        </pc:picChg>
+        <pc:picChg chg="add mod ord">
+          <ac:chgData name="Jauregui Beso, Jara" userId="545a1999-fc67-42e4-bc6e-07b57f946614" providerId="ADAL" clId="{AD861AA3-1B13-4595-854C-9F6C151E35BA}" dt="2022-11-03T11:30:36.937" v="1349" actId="167"/>
+          <ac:picMkLst>
+            <pc:docMk/>
+            <pc:sldMk cId="3560596556" sldId="272"/>
+            <ac:picMk id="6" creationId="{9420DA0D-0061-5BFB-60BF-5897393B5A6E}"/>
+          </ac:picMkLst>
+        </pc:picChg>
+        <pc:picChg chg="add del mod">
+          <ac:chgData name="Jauregui Beso, Jara" userId="545a1999-fc67-42e4-bc6e-07b57f946614" providerId="ADAL" clId="{AD861AA3-1B13-4595-854C-9F6C151E35BA}" dt="2022-11-03T11:31:00.925" v="1351"/>
+          <ac:picMkLst>
+            <pc:docMk/>
+            <pc:sldMk cId="3560596556" sldId="272"/>
+            <ac:picMk id="7" creationId="{F303DBBB-5645-209F-FF1D-BC61FA0E2700}"/>
+          </ac:picMkLst>
+        </pc:picChg>
+      </pc:sldChg>
+      <pc:sldChg chg="addSp delSp modSp add del mod">
+        <pc:chgData name="Jauregui Beso, Jara" userId="545a1999-fc67-42e4-bc6e-07b57f946614" providerId="ADAL" clId="{AD861AA3-1B13-4595-854C-9F6C151E35BA}" dt="2022-11-07T10:25:12.452" v="1983" actId="47"/>
+        <pc:sldMkLst>
+          <pc:docMk/>
+          <pc:sldMk cId="2535874916" sldId="273"/>
+        </pc:sldMkLst>
+        <pc:spChg chg="mod">
+          <ac:chgData name="Jauregui Beso, Jara" userId="545a1999-fc67-42e4-bc6e-07b57f946614" providerId="ADAL" clId="{AD861AA3-1B13-4595-854C-9F6C151E35BA}" dt="2022-11-03T11:46:16.915" v="1406" actId="20577"/>
+          <ac:spMkLst>
+            <pc:docMk/>
+            <pc:sldMk cId="2535874916" sldId="273"/>
+            <ac:spMk id="4" creationId="{20E6FDB1-60BC-85B0-3EA3-09433FA21E59}"/>
+          </ac:spMkLst>
+        </pc:spChg>
+        <pc:picChg chg="add del mod">
+          <ac:chgData name="Jauregui Beso, Jara" userId="545a1999-fc67-42e4-bc6e-07b57f946614" providerId="ADAL" clId="{AD861AA3-1B13-4595-854C-9F6C151E35BA}" dt="2022-11-03T11:36:04.688" v="1389" actId="21"/>
+          <ac:picMkLst>
+            <pc:docMk/>
+            <pc:sldMk cId="2535874916" sldId="273"/>
+            <ac:picMk id="3" creationId="{B78876F7-9A59-5EDA-6D68-E12AA608E98A}"/>
+          </ac:picMkLst>
+        </pc:picChg>
+        <pc:picChg chg="add mod ord">
+          <ac:chgData name="Jauregui Beso, Jara" userId="545a1999-fc67-42e4-bc6e-07b57f946614" providerId="ADAL" clId="{AD861AA3-1B13-4595-854C-9F6C151E35BA}" dt="2022-11-03T11:36:14.477" v="1394" actId="1076"/>
+          <ac:picMkLst>
+            <pc:docMk/>
+            <pc:sldMk cId="2535874916" sldId="273"/>
+            <ac:picMk id="5" creationId="{1D9ADAFB-67F8-3BB6-2095-75240B5DE3DE}"/>
+          </ac:picMkLst>
+        </pc:picChg>
+        <pc:picChg chg="del">
+          <ac:chgData name="Jauregui Beso, Jara" userId="545a1999-fc67-42e4-bc6e-07b57f946614" providerId="ADAL" clId="{AD861AA3-1B13-4595-854C-9F6C151E35BA}" dt="2022-11-03T11:36:06.039" v="1390" actId="478"/>
+          <ac:picMkLst>
+            <pc:docMk/>
+            <pc:sldMk cId="2535874916" sldId="273"/>
+            <ac:picMk id="6" creationId="{9420DA0D-0061-5BFB-60BF-5897393B5A6E}"/>
+          </ac:picMkLst>
+        </pc:picChg>
+      </pc:sldChg>
+      <pc:sldChg chg="addSp delSp modSp add mod">
+        <pc:chgData name="Jauregui Beso, Jara" userId="545a1999-fc67-42e4-bc6e-07b57f946614" providerId="ADAL" clId="{AD861AA3-1B13-4595-854C-9F6C151E35BA}" dt="2022-11-07T10:13:06.511" v="1520"/>
+        <pc:sldMkLst>
+          <pc:docMk/>
+          <pc:sldMk cId="3389449928" sldId="274"/>
+        </pc:sldMkLst>
+        <pc:spChg chg="del">
+          <ac:chgData name="Jauregui Beso, Jara" userId="545a1999-fc67-42e4-bc6e-07b57f946614" providerId="ADAL" clId="{AD861AA3-1B13-4595-854C-9F6C151E35BA}" dt="2022-11-07T10:13:06.272" v="1519" actId="478"/>
+          <ac:spMkLst>
+            <pc:docMk/>
+            <pc:sldMk cId="3389449928" sldId="274"/>
+            <ac:spMk id="6" creationId="{52A5B92E-70CA-DAC2-485F-85B149E59375}"/>
+          </ac:spMkLst>
+        </pc:spChg>
+        <pc:spChg chg="add mod">
+          <ac:chgData name="Jauregui Beso, Jara" userId="545a1999-fc67-42e4-bc6e-07b57f946614" providerId="ADAL" clId="{AD861AA3-1B13-4595-854C-9F6C151E35BA}" dt="2022-11-07T10:13:06.511" v="1520"/>
+          <ac:spMkLst>
+            <pc:docMk/>
+            <pc:sldMk cId="3389449928" sldId="274"/>
+            <ac:spMk id="7" creationId="{048F93AD-7EFE-4873-9FEF-50E0F31AA337}"/>
+          </ac:spMkLst>
+        </pc:spChg>
+        <pc:picChg chg="del">
+          <ac:chgData name="Jauregui Beso, Jara" userId="545a1999-fc67-42e4-bc6e-07b57f946614" providerId="ADAL" clId="{AD861AA3-1B13-4595-854C-9F6C151E35BA}" dt="2022-11-07T10:12:21.455" v="1457" actId="478"/>
+          <ac:picMkLst>
+            <pc:docMk/>
+            <pc:sldMk cId="3389449928" sldId="274"/>
+            <ac:picMk id="3" creationId="{04988A35-2B1C-DA5E-D94A-F20B88D17605}"/>
+          </ac:picMkLst>
+        </pc:picChg>
+        <pc:picChg chg="add mod ord">
+          <ac:chgData name="Jauregui Beso, Jara" userId="545a1999-fc67-42e4-bc6e-07b57f946614" providerId="ADAL" clId="{AD861AA3-1B13-4595-854C-9F6C151E35BA}" dt="2022-11-07T10:12:36.970" v="1463" actId="1076"/>
+          <ac:picMkLst>
+            <pc:docMk/>
+            <pc:sldMk cId="3389449928" sldId="274"/>
+            <ac:picMk id="5" creationId="{E9B97A04-774B-6EE6-36A8-B2648B791E42}"/>
+          </ac:picMkLst>
+        </pc:picChg>
+      </pc:sldChg>
+      <pc:sldChg chg="modSp add mod">
+        <pc:chgData name="Jauregui Beso, Jara" userId="545a1999-fc67-42e4-bc6e-07b57f946614" providerId="ADAL" clId="{AD861AA3-1B13-4595-854C-9F6C151E35BA}" dt="2022-11-07T10:20:20.478" v="1942" actId="113"/>
+        <pc:sldMkLst>
+          <pc:docMk/>
+          <pc:sldMk cId="91587047" sldId="275"/>
+        </pc:sldMkLst>
+        <pc:spChg chg="mod">
+          <ac:chgData name="Jauregui Beso, Jara" userId="545a1999-fc67-42e4-bc6e-07b57f946614" providerId="ADAL" clId="{AD861AA3-1B13-4595-854C-9F6C151E35BA}" dt="2022-11-07T10:20:20.478" v="1942" actId="113"/>
+          <ac:spMkLst>
+            <pc:docMk/>
+            <pc:sldMk cId="91587047" sldId="275"/>
+            <ac:spMk id="11" creationId="{99BAED0E-81C2-C67C-9F14-4EB2793F82AE}"/>
+          </ac:spMkLst>
+        </pc:spChg>
+        <pc:picChg chg="mod modCrop">
+          <ac:chgData name="Jauregui Beso, Jara" userId="545a1999-fc67-42e4-bc6e-07b57f946614" providerId="ADAL" clId="{AD861AA3-1B13-4595-854C-9F6C151E35BA}" dt="2022-11-07T10:17:35.245" v="1883" actId="1076"/>
+          <ac:picMkLst>
+            <pc:docMk/>
+            <pc:sldMk cId="91587047" sldId="275"/>
+            <ac:picMk id="9" creationId="{1DD11078-4070-8F15-DFC7-A11CEB60B02A}"/>
+          </ac:picMkLst>
+        </pc:picChg>
+      </pc:sldChg>
+      <pc:sldChg chg="modSp add mod">
+        <pc:chgData name="Jauregui Beso, Jara" userId="545a1999-fc67-42e4-bc6e-07b57f946614" providerId="ADAL" clId="{AD861AA3-1B13-4595-854C-9F6C151E35BA}" dt="2022-11-07T10:21:08.782" v="1948" actId="113"/>
+        <pc:sldMkLst>
+          <pc:docMk/>
+          <pc:sldMk cId="3817661182" sldId="276"/>
+        </pc:sldMkLst>
+        <pc:spChg chg="mod">
+          <ac:chgData name="Jauregui Beso, Jara" userId="545a1999-fc67-42e4-bc6e-07b57f946614" providerId="ADAL" clId="{AD861AA3-1B13-4595-854C-9F6C151E35BA}" dt="2022-11-07T10:21:08.782" v="1948" actId="113"/>
+          <ac:spMkLst>
+            <pc:docMk/>
+            <pc:sldMk cId="3817661182" sldId="276"/>
+            <ac:spMk id="11" creationId="{99BAED0E-81C2-C67C-9F14-4EB2793F82AE}"/>
+          </ac:spMkLst>
+        </pc:spChg>
+      </pc:sldChg>
+      <pc:sldChg chg="modSp add mod">
+        <pc:chgData name="Jauregui Beso, Jara" userId="545a1999-fc67-42e4-bc6e-07b57f946614" providerId="ADAL" clId="{AD861AA3-1B13-4595-854C-9F6C151E35BA}" dt="2022-11-07T10:21:53.005" v="1952"/>
+        <pc:sldMkLst>
+          <pc:docMk/>
+          <pc:sldMk cId="2386819989" sldId="277"/>
+        </pc:sldMkLst>
+        <pc:spChg chg="mod">
+          <ac:chgData name="Jauregui Beso, Jara" userId="545a1999-fc67-42e4-bc6e-07b57f946614" providerId="ADAL" clId="{AD861AA3-1B13-4595-854C-9F6C151E35BA}" dt="2022-11-07T10:21:53.005" v="1952"/>
+          <ac:spMkLst>
+            <pc:docMk/>
+            <pc:sldMk cId="2386819989" sldId="277"/>
+            <ac:spMk id="2" creationId="{C40AFC7F-5EA5-87CD-EEF2-6BDE715C738D}"/>
+          </ac:spMkLst>
+        </pc:spChg>
+      </pc:sldChg>
+      <pc:sldChg chg="modSp add mod">
+        <pc:chgData name="Jauregui Beso, Jara" userId="545a1999-fc67-42e4-bc6e-07b57f946614" providerId="ADAL" clId="{AD861AA3-1B13-4595-854C-9F6C151E35BA}" dt="2022-11-07T10:26:05.400" v="1990"/>
+        <pc:sldMkLst>
+          <pc:docMk/>
+          <pc:sldMk cId="3356519008" sldId="278"/>
+        </pc:sldMkLst>
+        <pc:spChg chg="mod">
+          <ac:chgData name="Jauregui Beso, Jara" userId="545a1999-fc67-42e4-bc6e-07b57f946614" providerId="ADAL" clId="{AD861AA3-1B13-4595-854C-9F6C151E35BA}" dt="2022-11-07T10:26:05.400" v="1990"/>
+          <ac:spMkLst>
+            <pc:docMk/>
+            <pc:sldMk cId="3356519008" sldId="278"/>
+            <ac:spMk id="4" creationId="{20E6FDB1-60BC-85B0-3EA3-09433FA21E59}"/>
+          </ac:spMkLst>
+        </pc:spChg>
+      </pc:sldChg>
+    </pc:docChg>
+  </pc:docChgLst>
+</pc:chgInfo>
 </file>
 
 <file path=ppt/slideLayouts/slideLayout1.xml><?xml version="1.0" encoding="utf-8"?>
@@ -264,7 +917,7 @@
           <a:p>
             <a:fld id="{046D3877-9706-4A9A-A778-097DEF198E05}" type="datetimeFigureOut">
               <a:rPr lang="en-US" smtClean="0"/>
-              <a:t>10/19/2022</a:t>
+              <a:t>11/3/2022</a:t>
             </a:fld>
             <a:endParaRPr lang="en-US"/>
           </a:p>
@@ -462,7 +1115,7 @@
           <a:p>
             <a:fld id="{046D3877-9706-4A9A-A778-097DEF198E05}" type="datetimeFigureOut">
               <a:rPr lang="en-US" smtClean="0"/>
-              <a:t>10/19/2022</a:t>
+              <a:t>11/3/2022</a:t>
             </a:fld>
             <a:endParaRPr lang="en-US"/>
           </a:p>
@@ -670,7 +1323,7 @@
           <a:p>
             <a:fld id="{046D3877-9706-4A9A-A778-097DEF198E05}" type="datetimeFigureOut">
               <a:rPr lang="en-US" smtClean="0"/>
-              <a:t>10/19/2022</a:t>
+              <a:t>11/3/2022</a:t>
             </a:fld>
             <a:endParaRPr lang="en-US"/>
           </a:p>
@@ -868,7 +1521,7 @@
           <a:p>
             <a:fld id="{046D3877-9706-4A9A-A778-097DEF198E05}" type="datetimeFigureOut">
               <a:rPr lang="en-US" smtClean="0"/>
-              <a:t>10/19/2022</a:t>
+              <a:t>11/3/2022</a:t>
             </a:fld>
             <a:endParaRPr lang="en-US"/>
           </a:p>
@@ -1143,7 +1796,7 @@
           <a:p>
             <a:fld id="{046D3877-9706-4A9A-A778-097DEF198E05}" type="datetimeFigureOut">
               <a:rPr lang="en-US" smtClean="0"/>
-              <a:t>10/19/2022</a:t>
+              <a:t>11/3/2022</a:t>
             </a:fld>
             <a:endParaRPr lang="en-US"/>
           </a:p>
@@ -1408,7 +2061,7 @@
           <a:p>
             <a:fld id="{046D3877-9706-4A9A-A778-097DEF198E05}" type="datetimeFigureOut">
               <a:rPr lang="en-US" smtClean="0"/>
-              <a:t>10/19/2022</a:t>
+              <a:t>11/3/2022</a:t>
             </a:fld>
             <a:endParaRPr lang="en-US"/>
           </a:p>
@@ -1820,7 +2473,7 @@
           <a:p>
             <a:fld id="{046D3877-9706-4A9A-A778-097DEF198E05}" type="datetimeFigureOut">
               <a:rPr lang="en-US" smtClean="0"/>
-              <a:t>10/19/2022</a:t>
+              <a:t>11/3/2022</a:t>
             </a:fld>
             <a:endParaRPr lang="en-US"/>
           </a:p>
@@ -1961,7 +2614,7 @@
           <a:p>
             <a:fld id="{046D3877-9706-4A9A-A778-097DEF198E05}" type="datetimeFigureOut">
               <a:rPr lang="en-US" smtClean="0"/>
-              <a:t>10/19/2022</a:t>
+              <a:t>11/3/2022</a:t>
             </a:fld>
             <a:endParaRPr lang="en-US"/>
           </a:p>
@@ -2074,7 +2727,7 @@
           <a:p>
             <a:fld id="{046D3877-9706-4A9A-A778-097DEF198E05}" type="datetimeFigureOut">
               <a:rPr lang="en-US" smtClean="0"/>
-              <a:t>10/19/2022</a:t>
+              <a:t>11/3/2022</a:t>
             </a:fld>
             <a:endParaRPr lang="en-US"/>
           </a:p>
@@ -2385,7 +3038,7 @@
           <a:p>
             <a:fld id="{046D3877-9706-4A9A-A778-097DEF198E05}" type="datetimeFigureOut">
               <a:rPr lang="en-US" smtClean="0"/>
-              <a:t>10/19/2022</a:t>
+              <a:t>11/3/2022</a:t>
             </a:fld>
             <a:endParaRPr lang="en-US"/>
           </a:p>
@@ -2673,7 +3326,7 @@
           <a:p>
             <a:fld id="{046D3877-9706-4A9A-A778-097DEF198E05}" type="datetimeFigureOut">
               <a:rPr lang="en-US" smtClean="0"/>
-              <a:t>10/19/2022</a:t>
+              <a:t>11/3/2022</a:t>
             </a:fld>
             <a:endParaRPr lang="en-US"/>
           </a:p>
@@ -2914,7 +3567,7 @@
           <a:p>
             <a:fld id="{046D3877-9706-4A9A-A778-097DEF198E05}" type="datetimeFigureOut">
               <a:rPr lang="en-US" smtClean="0"/>
-              <a:t>10/19/2022</a:t>
+              <a:t>11/3/2022</a:t>
             </a:fld>
             <a:endParaRPr lang="en-US"/>
           </a:p>
@@ -3331,46 +3984,63 @@
           <a:chExt cx="0" cy="0"/>
         </a:xfrm>
       </p:grpSpPr>
-      <p:pic>
-        <p:nvPicPr>
-          <p:cNvPr id="9" name="Picture 8" descr="Chart&#10;&#10;Description automatically generated">
-            <a:extLst>
-              <a:ext uri="{FF2B5EF4-FFF2-40B4-BE49-F238E27FC236}">
-                <a16:creationId xmlns:a16="http://schemas.microsoft.com/office/drawing/2014/main" id="{0D92446F-FA1E-5BF7-5462-E7CE30964EE0}"/>
-              </a:ext>
-            </a:extLst>
-          </p:cNvPr>
-          <p:cNvPicPr>
-            <a:picLocks noChangeAspect="1"/>
-          </p:cNvPicPr>
-          <p:nvPr/>
-        </p:nvPicPr>
-        <p:blipFill>
-          <a:blip r:embed="rId2">
-            <a:extLst>
-              <a:ext uri="{28A0092B-C50C-407E-A947-70E740481C1C}">
-                <a14:useLocalDpi xmlns:a14="http://schemas.microsoft.com/office/drawing/2010/main" val="0"/>
-              </a:ext>
-            </a:extLst>
-          </a:blip>
-          <a:stretch>
-            <a:fillRect/>
-          </a:stretch>
-        </p:blipFill>
-        <p:spPr>
-          <a:xfrm>
-            <a:off x="1095681" y="0"/>
-            <a:ext cx="10287000" cy="6858000"/>
-          </a:xfrm>
-          <a:prstGeom prst="rect">
-            <a:avLst/>
-          </a:prstGeom>
-        </p:spPr>
-      </p:pic>
+      <p:sp>
+        <p:nvSpPr>
+          <p:cNvPr id="2" name="Title 1">
+            <a:extLst>
+              <a:ext uri="{FF2B5EF4-FFF2-40B4-BE49-F238E27FC236}">
+                <a16:creationId xmlns:a16="http://schemas.microsoft.com/office/drawing/2014/main" id="{BA5E6F36-563B-3818-761F-EAF303C2D618}"/>
+              </a:ext>
+            </a:extLst>
+          </p:cNvPr>
+          <p:cNvSpPr>
+            <a:spLocks noGrp="1"/>
+          </p:cNvSpPr>
+          <p:nvPr>
+            <p:ph type="title"/>
+          </p:nvPr>
+        </p:nvSpPr>
+        <p:spPr/>
+        <p:txBody>
+          <a:bodyPr/>
+          <a:lstStyle/>
+          <a:p>
+            <a:r>
+              <a:rPr lang="en-GB" dirty="0"/>
+              <a:t>Design, dataset (altitudes and dates), indexes </a:t>
+            </a:r>
+          </a:p>
+        </p:txBody>
+      </p:sp>
+      <p:sp>
+        <p:nvSpPr>
+          <p:cNvPr id="3" name="Content Placeholder 2">
+            <a:extLst>
+              <a:ext uri="{FF2B5EF4-FFF2-40B4-BE49-F238E27FC236}">
+                <a16:creationId xmlns:a16="http://schemas.microsoft.com/office/drawing/2014/main" id="{1432A79D-AE7E-F3E3-0135-2F0EE1114BBE}"/>
+              </a:ext>
+            </a:extLst>
+          </p:cNvPr>
+          <p:cNvSpPr>
+            <a:spLocks noGrp="1"/>
+          </p:cNvSpPr>
+          <p:nvPr>
+            <p:ph idx="1"/>
+          </p:nvPr>
+        </p:nvSpPr>
+        <p:spPr/>
+        <p:txBody>
+          <a:bodyPr/>
+          <a:lstStyle/>
+          <a:p>
+            <a:endParaRPr lang="en-GB"/>
+          </a:p>
+        </p:txBody>
+      </p:sp>
     </p:spTree>
     <p:extLst>
       <p:ext uri="{BB962C8B-B14F-4D97-AF65-F5344CB8AC3E}">
-        <p14:creationId xmlns:p14="http://schemas.microsoft.com/office/powerpoint/2010/main" val="4221457052"/>
+        <p14:creationId xmlns:p14="http://schemas.microsoft.com/office/powerpoint/2010/main" val="941861617"/>
       </p:ext>
     </p:extLst>
   </p:cSld>
@@ -3402,7 +4072,7 @@
           <p:cNvPr id="2" name="Title 1">
             <a:extLst>
               <a:ext uri="{FF2B5EF4-FFF2-40B4-BE49-F238E27FC236}">
-                <a16:creationId xmlns:a16="http://schemas.microsoft.com/office/drawing/2014/main" id="{9436E8AB-C561-2FCA-0265-5CB6416C4D16}"/>
+                <a16:creationId xmlns:a16="http://schemas.microsoft.com/office/drawing/2014/main" id="{C40AFC7F-5EA5-87CD-EEF2-6BDE715C738D}"/>
               </a:ext>
             </a:extLst>
           </p:cNvPr>
@@ -3413,24 +4083,29 @@
             <p:ph type="title"/>
           </p:nvPr>
         </p:nvSpPr>
-        <p:spPr/>
+        <p:spPr>
+          <a:xfrm>
+            <a:off x="693605" y="462450"/>
+            <a:ext cx="10515600" cy="1325563"/>
+          </a:xfrm>
+        </p:spPr>
         <p:txBody>
           <a:bodyPr/>
           <a:lstStyle/>
           <a:p>
             <a:r>
-              <a:rPr lang="es-ES" b="1" dirty="0" err="1"/>
-              <a:t>Random</a:t>
-            </a:r>
-            <a:r>
-              <a:rPr lang="es-ES" b="1" dirty="0"/>
-              <a:t> </a:t>
-            </a:r>
-            <a:r>
-              <a:rPr lang="es-ES" b="1" dirty="0" err="1"/>
-              <a:t>Forests</a:t>
-            </a:r>
-            <a:endParaRPr lang="en-US" b="1" dirty="0"/>
+              <a:rPr lang="en-US" b="1" dirty="0"/>
+              <a:t>CART trees (</a:t>
+            </a:r>
+            <a:r>
+              <a:rPr lang="en-US" b="1" dirty="0" err="1"/>
+              <a:t>rpart</a:t>
+            </a:r>
+            <a:r>
+              <a:rPr lang="en-US" b="1" dirty="0"/>
+              <a:t>)</a:t>
+            </a:r>
+            <a:endParaRPr lang="en-US" dirty="0"/>
           </a:p>
         </p:txBody>
       </p:sp>
@@ -3439,7 +4114,7 @@
           <p:cNvPr id="11" name="TextBox 10">
             <a:extLst>
               <a:ext uri="{FF2B5EF4-FFF2-40B4-BE49-F238E27FC236}">
-                <a16:creationId xmlns:a16="http://schemas.microsoft.com/office/drawing/2014/main" id="{260FD1F0-D4F9-64B8-21EE-35A657542C55}"/>
+                <a16:creationId xmlns:a16="http://schemas.microsoft.com/office/drawing/2014/main" id="{99BAED0E-81C2-C67C-9F14-4EB2793F82AE}"/>
               </a:ext>
             </a:extLst>
           </p:cNvPr>
@@ -3448,8 +4123,8 @@
         </p:nvSpPr>
         <p:spPr>
           <a:xfrm>
-            <a:off x="9618661" y="86510"/>
-            <a:ext cx="2579159" cy="707886"/>
+            <a:off x="693604" y="1788013"/>
+            <a:ext cx="9066621" cy="1852815"/>
           </a:xfrm>
           <a:prstGeom prst="rect">
             <a:avLst/>
@@ -3462,160 +4137,48 @@
           </a:bodyPr>
           <a:lstStyle/>
           <a:p>
-            <a:r>
-              <a:rPr lang="es-ES" sz="4000" u="sng" dirty="0"/>
-              <a:t>30m</a:t>
-            </a:r>
-            <a:r>
-              <a:rPr lang="es-ES" sz="4000" dirty="0"/>
-              <a:t> 03-09</a:t>
-            </a:r>
-            <a:endParaRPr lang="en-US" sz="4000" dirty="0"/>
-          </a:p>
-        </p:txBody>
-      </p:sp>
-      <p:sp>
-        <p:nvSpPr>
-          <p:cNvPr id="15" name="TextBox 14">
-            <a:extLst>
-              <a:ext uri="{FF2B5EF4-FFF2-40B4-BE49-F238E27FC236}">
-                <a16:creationId xmlns:a16="http://schemas.microsoft.com/office/drawing/2014/main" id="{4AC1055D-C3A9-1E1F-3930-E7CF498C7519}"/>
-              </a:ext>
-            </a:extLst>
-          </p:cNvPr>
-          <p:cNvSpPr txBox="1"/>
-          <p:nvPr/>
-        </p:nvSpPr>
-        <p:spPr>
-          <a:xfrm>
-            <a:off x="838200" y="1507638"/>
-            <a:ext cx="3911600" cy="1477328"/>
-          </a:xfrm>
-          <a:prstGeom prst="rect">
-            <a:avLst/>
-          </a:prstGeom>
-          <a:noFill/>
-        </p:spPr>
-        <p:txBody>
-          <a:bodyPr wrap="square" rtlCol="0">
-            <a:spAutoFit/>
-          </a:bodyPr>
-          <a:lstStyle/>
-          <a:p>
-            <a:r>
-              <a:rPr lang="es-ES" dirty="0"/>
-              <a:t>PC1 &amp; PC2</a:t>
-            </a:r>
-          </a:p>
-          <a:p>
-            <a:endParaRPr lang="es-ES" dirty="0"/>
-          </a:p>
-          <a:p>
-            <a:r>
-              <a:rPr lang="es-ES" dirty="0"/>
-              <a:t>70% </a:t>
-            </a:r>
-            <a:r>
-              <a:rPr lang="es-ES" dirty="0" err="1"/>
-              <a:t>train</a:t>
-            </a:r>
-            <a:r>
-              <a:rPr lang="es-ES" dirty="0"/>
-              <a:t> 30% test </a:t>
-            </a:r>
-            <a:r>
-              <a:rPr lang="es-ES" dirty="0" err="1"/>
-              <a:t>random</a:t>
-            </a:r>
-            <a:r>
-              <a:rPr lang="es-ES" dirty="0"/>
-              <a:t> </a:t>
-            </a:r>
-            <a:r>
-              <a:rPr lang="es-ES" dirty="0" err="1"/>
-              <a:t>split</a:t>
-            </a:r>
-            <a:endParaRPr lang="es-ES" dirty="0"/>
-          </a:p>
-          <a:p>
-            <a:endParaRPr lang="es-ES" dirty="0"/>
-          </a:p>
-          <a:p>
-            <a:r>
-              <a:rPr lang="es-ES" dirty="0"/>
-              <a:t>10000 </a:t>
-            </a:r>
-            <a:r>
-              <a:rPr lang="es-ES" dirty="0" err="1"/>
-              <a:t>trees</a:t>
-            </a:r>
-            <a:endParaRPr lang="en-US" dirty="0"/>
-          </a:p>
-        </p:txBody>
-      </p:sp>
-      <p:pic>
-        <p:nvPicPr>
-          <p:cNvPr id="9" name="Picture 8">
-            <a:extLst>
-              <a:ext uri="{FF2B5EF4-FFF2-40B4-BE49-F238E27FC236}">
-                <a16:creationId xmlns:a16="http://schemas.microsoft.com/office/drawing/2014/main" id="{7CAED757-18A1-9153-D981-22A841E0F0BE}"/>
-              </a:ext>
-            </a:extLst>
-          </p:cNvPr>
-          <p:cNvPicPr>
-            <a:picLocks noChangeAspect="1"/>
-          </p:cNvPicPr>
-          <p:nvPr/>
-        </p:nvPicPr>
-        <p:blipFill rotWithShape="1">
-          <a:blip r:embed="rId2"/>
-          <a:srcRect b="72412"/>
-          <a:stretch/>
-        </p:blipFill>
-        <p:spPr>
-          <a:xfrm>
-            <a:off x="1073887" y="3573481"/>
-            <a:ext cx="4183913" cy="2150354"/>
-          </a:xfrm>
-          <a:prstGeom prst="rect">
-            <a:avLst/>
-          </a:prstGeom>
-        </p:spPr>
-      </p:pic>
-      <p:pic>
-        <p:nvPicPr>
-          <p:cNvPr id="12" name="Picture 11">
-            <a:extLst>
-              <a:ext uri="{FF2B5EF4-FFF2-40B4-BE49-F238E27FC236}">
-                <a16:creationId xmlns:a16="http://schemas.microsoft.com/office/drawing/2014/main" id="{420D1C0C-B835-51FA-09F4-85E7C3E0DB7E}"/>
-              </a:ext>
-            </a:extLst>
-          </p:cNvPr>
-          <p:cNvPicPr>
-            <a:picLocks noChangeAspect="1"/>
-          </p:cNvPicPr>
-          <p:nvPr/>
-        </p:nvPicPr>
-        <p:blipFill>
-          <a:blip r:embed="rId3"/>
-          <a:stretch>
-            <a:fillRect/>
-          </a:stretch>
-        </p:blipFill>
-        <p:spPr>
-          <a:xfrm>
-            <a:off x="6413500" y="1073011"/>
-            <a:ext cx="5245100" cy="4781550"/>
-          </a:xfrm>
-          <a:prstGeom prst="rect">
-            <a:avLst/>
-          </a:prstGeom>
-        </p:spPr>
-      </p:pic>
+            <a:pPr>
+              <a:lnSpc>
+                <a:spcPct val="200000"/>
+              </a:lnSpc>
+            </a:pPr>
+            <a:r>
+              <a:rPr lang="en-US" sz="2000" b="1" dirty="0"/>
+              <a:t>10-fold Cross-Validation with 10 repeats</a:t>
+            </a:r>
+          </a:p>
+          <a:p>
+            <a:pPr marL="457200" indent="-457200">
+              <a:lnSpc>
+                <a:spcPct val="200000"/>
+              </a:lnSpc>
+              <a:buFont typeface="+mj-lt"/>
+              <a:buAutoNum type="arabicParenR"/>
+            </a:pPr>
+            <a:r>
+              <a:rPr lang="en-US" sz="2000" dirty="0"/>
+              <a:t>Model trained with entire dataset</a:t>
+            </a:r>
+          </a:p>
+          <a:p>
+            <a:pPr marL="457200" indent="-457200">
+              <a:lnSpc>
+                <a:spcPct val="200000"/>
+              </a:lnSpc>
+              <a:buFont typeface="+mj-lt"/>
+              <a:buAutoNum type="arabicParenR"/>
+            </a:pPr>
+            <a:r>
+              <a:rPr lang="en-US" sz="2000" dirty="0"/>
+              <a:t>Model trained in 80% of the data, accuracy tested in 20% holdout </a:t>
+            </a:r>
+          </a:p>
+        </p:txBody>
+      </p:sp>
     </p:spTree>
     <p:extLst>
       <p:ext uri="{BB962C8B-B14F-4D97-AF65-F5344CB8AC3E}">
-        <p14:creationId xmlns:p14="http://schemas.microsoft.com/office/powerpoint/2010/main" val="3303346691"/>
+        <p14:creationId xmlns:p14="http://schemas.microsoft.com/office/powerpoint/2010/main" val="2327810541"/>
       </p:ext>
     </p:extLst>
   </p:cSld>
@@ -3642,12 +4205,47 @@
           <a:chExt cx="0" cy="0"/>
         </a:xfrm>
       </p:grpSpPr>
+      <p:pic>
+        <p:nvPicPr>
+          <p:cNvPr id="9" name="Picture 8" descr="Diagram&#10;&#10;Description automatically generated">
+            <a:extLst>
+              <a:ext uri="{FF2B5EF4-FFF2-40B4-BE49-F238E27FC236}">
+                <a16:creationId xmlns:a16="http://schemas.microsoft.com/office/drawing/2014/main" id="{1DD11078-4070-8F15-DFC7-A11CEB60B02A}"/>
+              </a:ext>
+            </a:extLst>
+          </p:cNvPr>
+          <p:cNvPicPr>
+            <a:picLocks noChangeAspect="1"/>
+          </p:cNvPicPr>
+          <p:nvPr/>
+        </p:nvPicPr>
+        <p:blipFill rotWithShape="1">
+          <a:blip r:embed="rId2">
+            <a:extLst>
+              <a:ext uri="{28A0092B-C50C-407E-A947-70E740481C1C}">
+                <a14:useLocalDpi xmlns:a14="http://schemas.microsoft.com/office/drawing/2010/main" val="0"/>
+              </a:ext>
+            </a:extLst>
+          </a:blip>
+          <a:srcRect l="4323" r="2847" b="9926"/>
+          <a:stretch/>
+        </p:blipFill>
+        <p:spPr>
+          <a:xfrm>
+            <a:off x="4846983" y="136189"/>
+            <a:ext cx="7345017" cy="6030425"/>
+          </a:xfrm>
+          <a:prstGeom prst="rect">
+            <a:avLst/>
+          </a:prstGeom>
+        </p:spPr>
+      </p:pic>
       <p:sp>
         <p:nvSpPr>
           <p:cNvPr id="2" name="Title 1">
             <a:extLst>
               <a:ext uri="{FF2B5EF4-FFF2-40B4-BE49-F238E27FC236}">
-                <a16:creationId xmlns:a16="http://schemas.microsoft.com/office/drawing/2014/main" id="{9436E8AB-C561-2FCA-0265-5CB6416C4D16}"/>
+                <a16:creationId xmlns:a16="http://schemas.microsoft.com/office/drawing/2014/main" id="{C40AFC7F-5EA5-87CD-EEF2-6BDE715C738D}"/>
               </a:ext>
             </a:extLst>
           </p:cNvPr>
@@ -3658,24 +4256,29 @@
             <p:ph type="title"/>
           </p:nvPr>
         </p:nvSpPr>
-        <p:spPr/>
+        <p:spPr>
+          <a:xfrm>
+            <a:off x="693605" y="462450"/>
+            <a:ext cx="10515600" cy="1325563"/>
+          </a:xfrm>
+        </p:spPr>
         <p:txBody>
           <a:bodyPr/>
           <a:lstStyle/>
           <a:p>
             <a:r>
-              <a:rPr lang="es-ES" b="1" dirty="0" err="1"/>
-              <a:t>Random</a:t>
-            </a:r>
-            <a:r>
-              <a:rPr lang="es-ES" b="1" dirty="0"/>
-              <a:t> </a:t>
-            </a:r>
-            <a:r>
-              <a:rPr lang="es-ES" b="1" dirty="0" err="1"/>
-              <a:t>Forests</a:t>
-            </a:r>
-            <a:endParaRPr lang="en-US" b="1" dirty="0"/>
+              <a:rPr lang="en-US" b="1" dirty="0"/>
+              <a:t>CART trees (</a:t>
+            </a:r>
+            <a:r>
+              <a:rPr lang="en-US" b="1" dirty="0" err="1"/>
+              <a:t>rpart</a:t>
+            </a:r>
+            <a:r>
+              <a:rPr lang="en-US" b="1" dirty="0"/>
+              <a:t>)</a:t>
+            </a:r>
+            <a:endParaRPr lang="en-US" dirty="0"/>
           </a:p>
         </p:txBody>
       </p:sp>
@@ -3684,7 +4287,7 @@
           <p:cNvPr id="11" name="TextBox 10">
             <a:extLst>
               <a:ext uri="{FF2B5EF4-FFF2-40B4-BE49-F238E27FC236}">
-                <a16:creationId xmlns:a16="http://schemas.microsoft.com/office/drawing/2014/main" id="{260FD1F0-D4F9-64B8-21EE-35A657542C55}"/>
+                <a16:creationId xmlns:a16="http://schemas.microsoft.com/office/drawing/2014/main" id="{99BAED0E-81C2-C67C-9F14-4EB2793F82AE}"/>
               </a:ext>
             </a:extLst>
           </p:cNvPr>
@@ -3693,8 +4296,8 @@
         </p:nvSpPr>
         <p:spPr>
           <a:xfrm>
-            <a:off x="9618661" y="86510"/>
-            <a:ext cx="2579159" cy="707886"/>
+            <a:off x="417443" y="1788013"/>
+            <a:ext cx="5257800" cy="2468368"/>
           </a:xfrm>
           <a:prstGeom prst="rect">
             <a:avLst/>
@@ -3707,24 +4310,184 @@
           </a:bodyPr>
           <a:lstStyle/>
           <a:p>
-            <a:r>
-              <a:rPr lang="es-ES" sz="4000" u="sng" dirty="0"/>
-              <a:t>50m</a:t>
-            </a:r>
-            <a:r>
-              <a:rPr lang="es-ES" sz="4000" dirty="0"/>
-              <a:t> 03-22</a:t>
-            </a:r>
-            <a:endParaRPr lang="en-US" sz="4000" dirty="0"/>
-          </a:p>
-        </p:txBody>
-      </p:sp>
-      <p:sp>
-        <p:nvSpPr>
-          <p:cNvPr id="15" name="TextBox 14">
-            <a:extLst>
-              <a:ext uri="{FF2B5EF4-FFF2-40B4-BE49-F238E27FC236}">
-                <a16:creationId xmlns:a16="http://schemas.microsoft.com/office/drawing/2014/main" id="{4AC1055D-C3A9-1E1F-3930-E7CF498C7519}"/>
+            <a:pPr>
+              <a:lnSpc>
+                <a:spcPct val="200000"/>
+              </a:lnSpc>
+            </a:pPr>
+            <a:r>
+              <a:rPr lang="en-US" sz="2000" b="1" dirty="0"/>
+              <a:t>1) Trained with entire dataset (not validated)</a:t>
+            </a:r>
+          </a:p>
+          <a:p>
+            <a:pPr>
+              <a:lnSpc>
+                <a:spcPct val="200000"/>
+              </a:lnSpc>
+            </a:pPr>
+            <a:r>
+              <a:rPr lang="en-US" sz="2000" dirty="0"/>
+              <a:t>Best performance : 03-22 at 50m w/o PC</a:t>
+            </a:r>
+          </a:p>
+          <a:p>
+            <a:pPr marL="285750" indent="-285750">
+              <a:lnSpc>
+                <a:spcPct val="200000"/>
+              </a:lnSpc>
+              <a:buFont typeface="Arial" panose="020B0604020202020204" pitchFamily="34" charset="0"/>
+              <a:buChar char="•"/>
+            </a:pPr>
+            <a:r>
+              <a:rPr lang="en-US" sz="2000" dirty="0"/>
+              <a:t>Mean accuracy: 88 % (</a:t>
+            </a:r>
+            <a:r>
+              <a:rPr lang="en-US" sz="2000" dirty="0" err="1"/>
+              <a:t>sd</a:t>
+            </a:r>
+            <a:r>
+              <a:rPr lang="en-US" sz="2000" dirty="0"/>
+              <a:t>:</a:t>
+            </a:r>
+          </a:p>
+          <a:p>
+            <a:pPr marL="285750" indent="-285750">
+              <a:lnSpc>
+                <a:spcPct val="200000"/>
+              </a:lnSpc>
+              <a:buFont typeface="Arial" panose="020B0604020202020204" pitchFamily="34" charset="0"/>
+              <a:buChar char="•"/>
+            </a:pPr>
+            <a:r>
+              <a:rPr lang="en-US" sz="2000" dirty="0"/>
+              <a:t>Mean Kappa:  84.5 % (</a:t>
+            </a:r>
+            <a:r>
+              <a:rPr lang="en-US" sz="2000" dirty="0" err="1"/>
+              <a:t>sd</a:t>
+            </a:r>
+            <a:r>
+              <a:rPr lang="en-US" sz="2000" dirty="0"/>
+              <a:t>: 	</a:t>
+            </a:r>
+          </a:p>
+        </p:txBody>
+      </p:sp>
+    </p:spTree>
+    <p:extLst>
+      <p:ext uri="{BB962C8B-B14F-4D97-AF65-F5344CB8AC3E}">
+        <p14:creationId xmlns:p14="http://schemas.microsoft.com/office/powerpoint/2010/main" val="91587047"/>
+      </p:ext>
+    </p:extLst>
+  </p:cSld>
+  <p:clrMapOvr>
+    <a:masterClrMapping/>
+  </p:clrMapOvr>
+</p:sld>
+</file>
+
+<file path=ppt/slides/slide12.xml><?xml version="1.0" encoding="utf-8"?>
+<p:sld xmlns:a="http://schemas.openxmlformats.org/drawingml/2006/main" xmlns:r="http://schemas.openxmlformats.org/officeDocument/2006/relationships" xmlns:p="http://schemas.openxmlformats.org/presentationml/2006/main">
+  <p:cSld>
+    <p:spTree>
+      <p:nvGrpSpPr>
+        <p:cNvPr id="1" name=""/>
+        <p:cNvGrpSpPr/>
+        <p:nvPr/>
+      </p:nvGrpSpPr>
+      <p:grpSpPr>
+        <a:xfrm>
+          <a:off x="0" y="0"/>
+          <a:ext cx="0" cy="0"/>
+          <a:chOff x="0" y="0"/>
+          <a:chExt cx="0" cy="0"/>
+        </a:xfrm>
+      </p:grpSpPr>
+      <p:pic>
+        <p:nvPicPr>
+          <p:cNvPr id="9" name="Picture 8" descr="Diagram&#10;&#10;Description automatically generated">
+            <a:extLst>
+              <a:ext uri="{FF2B5EF4-FFF2-40B4-BE49-F238E27FC236}">
+                <a16:creationId xmlns:a16="http://schemas.microsoft.com/office/drawing/2014/main" id="{1DD11078-4070-8F15-DFC7-A11CEB60B02A}"/>
+              </a:ext>
+            </a:extLst>
+          </p:cNvPr>
+          <p:cNvPicPr>
+            <a:picLocks noChangeAspect="1"/>
+          </p:cNvPicPr>
+          <p:nvPr/>
+        </p:nvPicPr>
+        <p:blipFill rotWithShape="1">
+          <a:blip r:embed="rId2">
+            <a:extLst>
+              <a:ext uri="{28A0092B-C50C-407E-A947-70E740481C1C}">
+                <a14:useLocalDpi xmlns:a14="http://schemas.microsoft.com/office/drawing/2010/main" val="0"/>
+              </a:ext>
+            </a:extLst>
+          </a:blip>
+          <a:srcRect l="4323" r="2847" b="9926"/>
+          <a:stretch/>
+        </p:blipFill>
+        <p:spPr>
+          <a:xfrm>
+            <a:off x="4846983" y="136189"/>
+            <a:ext cx="7345017" cy="6030425"/>
+          </a:xfrm>
+          <a:prstGeom prst="rect">
+            <a:avLst/>
+          </a:prstGeom>
+        </p:spPr>
+      </p:pic>
+      <p:sp>
+        <p:nvSpPr>
+          <p:cNvPr id="2" name="Title 1">
+            <a:extLst>
+              <a:ext uri="{FF2B5EF4-FFF2-40B4-BE49-F238E27FC236}">
+                <a16:creationId xmlns:a16="http://schemas.microsoft.com/office/drawing/2014/main" id="{C40AFC7F-5EA5-87CD-EEF2-6BDE715C738D}"/>
+              </a:ext>
+            </a:extLst>
+          </p:cNvPr>
+          <p:cNvSpPr>
+            <a:spLocks noGrp="1"/>
+          </p:cNvSpPr>
+          <p:nvPr>
+            <p:ph type="title"/>
+          </p:nvPr>
+        </p:nvSpPr>
+        <p:spPr>
+          <a:xfrm>
+            <a:off x="693605" y="462450"/>
+            <a:ext cx="10515600" cy="1325563"/>
+          </a:xfrm>
+        </p:spPr>
+        <p:txBody>
+          <a:bodyPr/>
+          <a:lstStyle/>
+          <a:p>
+            <a:r>
+              <a:rPr lang="en-US" b="1" dirty="0"/>
+              <a:t>CART trees (</a:t>
+            </a:r>
+            <a:r>
+              <a:rPr lang="en-US" b="1" dirty="0" err="1"/>
+              <a:t>rpart</a:t>
+            </a:r>
+            <a:r>
+              <a:rPr lang="en-US" b="1" dirty="0"/>
+              <a:t>)</a:t>
+            </a:r>
+            <a:endParaRPr lang="en-US" dirty="0"/>
+          </a:p>
+        </p:txBody>
+      </p:sp>
+      <p:sp>
+        <p:nvSpPr>
+          <p:cNvPr id="11" name="TextBox 10">
+            <a:extLst>
+              <a:ext uri="{FF2B5EF4-FFF2-40B4-BE49-F238E27FC236}">
+                <a16:creationId xmlns:a16="http://schemas.microsoft.com/office/drawing/2014/main" id="{99BAED0E-81C2-C67C-9F14-4EB2793F82AE}"/>
               </a:ext>
             </a:extLst>
           </p:cNvPr>
@@ -3733,8 +4496,8 @@
         </p:nvSpPr>
         <p:spPr>
           <a:xfrm>
-            <a:off x="838200" y="1507638"/>
-            <a:ext cx="3911600" cy="1477328"/>
+            <a:off x="417443" y="1788013"/>
+            <a:ext cx="5257800" cy="3083921"/>
           </a:xfrm>
           <a:prstGeom prst="rect">
             <a:avLst/>
@@ -3747,63 +4510,245 @@
           </a:bodyPr>
           <a:lstStyle/>
           <a:p>
-            <a:r>
-              <a:rPr lang="es-ES" dirty="0"/>
-              <a:t>PC1 &amp; PC2</a:t>
-            </a:r>
-          </a:p>
-          <a:p>
-            <a:endParaRPr lang="es-ES" dirty="0"/>
-          </a:p>
-          <a:p>
-            <a:r>
-              <a:rPr lang="es-ES" dirty="0"/>
-              <a:t>70% </a:t>
-            </a:r>
-            <a:r>
-              <a:rPr lang="es-ES" dirty="0" err="1"/>
-              <a:t>train</a:t>
-            </a:r>
-            <a:r>
-              <a:rPr lang="es-ES" dirty="0"/>
-              <a:t> 30% test </a:t>
-            </a:r>
-            <a:r>
-              <a:rPr lang="es-ES" dirty="0" err="1"/>
-              <a:t>random</a:t>
-            </a:r>
-            <a:r>
-              <a:rPr lang="es-ES" dirty="0"/>
-              <a:t> </a:t>
-            </a:r>
-            <a:r>
-              <a:rPr lang="es-ES" dirty="0" err="1"/>
-              <a:t>split</a:t>
-            </a:r>
-            <a:endParaRPr lang="es-ES" dirty="0"/>
-          </a:p>
-          <a:p>
-            <a:endParaRPr lang="es-ES" dirty="0"/>
-          </a:p>
-          <a:p>
-            <a:r>
-              <a:rPr lang="es-ES" dirty="0"/>
-              <a:t>10000 </a:t>
-            </a:r>
-            <a:r>
-              <a:rPr lang="es-ES" dirty="0" err="1"/>
-              <a:t>trees</a:t>
+            <a:pPr>
+              <a:lnSpc>
+                <a:spcPct val="200000"/>
+              </a:lnSpc>
+            </a:pPr>
+            <a:r>
+              <a:rPr lang="en-US" sz="2000" b="1" dirty="0"/>
+              <a:t>2) Trained in 80% of the data, accuracy tested in 20% holdout </a:t>
+            </a:r>
+          </a:p>
+          <a:p>
+            <a:pPr>
+              <a:lnSpc>
+                <a:spcPct val="200000"/>
+              </a:lnSpc>
+            </a:pPr>
+            <a:r>
+              <a:rPr lang="en-US" sz="2000" dirty="0"/>
+              <a:t>Best performance : 03-22 at 50m w/o PC</a:t>
+            </a:r>
+          </a:p>
+          <a:p>
+            <a:pPr marL="285750" indent="-285750">
+              <a:lnSpc>
+                <a:spcPct val="200000"/>
+              </a:lnSpc>
+              <a:buFont typeface="Arial" panose="020B0604020202020204" pitchFamily="34" charset="0"/>
+              <a:buChar char="•"/>
+            </a:pPr>
+            <a:r>
+              <a:rPr lang="en-US" sz="2000" dirty="0"/>
+              <a:t>Mean accuracy: 88 % (</a:t>
+            </a:r>
+            <a:r>
+              <a:rPr lang="en-US" sz="2000" dirty="0" err="1"/>
+              <a:t>sd</a:t>
+            </a:r>
+            <a:r>
+              <a:rPr lang="en-US" sz="2000" dirty="0"/>
+              <a:t>:</a:t>
+            </a:r>
+          </a:p>
+          <a:p>
+            <a:pPr marL="285750" indent="-285750">
+              <a:lnSpc>
+                <a:spcPct val="200000"/>
+              </a:lnSpc>
+              <a:buFont typeface="Arial" panose="020B0604020202020204" pitchFamily="34" charset="0"/>
+              <a:buChar char="•"/>
+            </a:pPr>
+            <a:r>
+              <a:rPr lang="en-US" sz="2000" dirty="0"/>
+              <a:t>Mean Kappa:  84.5 % (</a:t>
+            </a:r>
+            <a:r>
+              <a:rPr lang="en-US" sz="2000" dirty="0" err="1"/>
+              <a:t>sd</a:t>
+            </a:r>
+            <a:r>
+              <a:rPr lang="en-US" sz="2000" dirty="0"/>
+              <a:t>: 	</a:t>
+            </a:r>
+          </a:p>
+        </p:txBody>
+      </p:sp>
+    </p:spTree>
+    <p:extLst>
+      <p:ext uri="{BB962C8B-B14F-4D97-AF65-F5344CB8AC3E}">
+        <p14:creationId xmlns:p14="http://schemas.microsoft.com/office/powerpoint/2010/main" val="3817661182"/>
+      </p:ext>
+    </p:extLst>
+  </p:cSld>
+  <p:clrMapOvr>
+    <a:masterClrMapping/>
+  </p:clrMapOvr>
+</p:sld>
+</file>
+
+<file path=ppt/slides/slide13.xml><?xml version="1.0" encoding="utf-8"?>
+<p:sld xmlns:a="http://schemas.openxmlformats.org/drawingml/2006/main" xmlns:r="http://schemas.openxmlformats.org/officeDocument/2006/relationships" xmlns:p="http://schemas.openxmlformats.org/presentationml/2006/main">
+  <p:cSld>
+    <p:spTree>
+      <p:nvGrpSpPr>
+        <p:cNvPr id="1" name=""/>
+        <p:cNvGrpSpPr/>
+        <p:nvPr/>
+      </p:nvGrpSpPr>
+      <p:grpSpPr>
+        <a:xfrm>
+          <a:off x="0" y="0"/>
+          <a:ext cx="0" cy="0"/>
+          <a:chOff x="0" y="0"/>
+          <a:chExt cx="0" cy="0"/>
+        </a:xfrm>
+      </p:grpSpPr>
+      <p:sp>
+        <p:nvSpPr>
+          <p:cNvPr id="2" name="Title 1">
+            <a:extLst>
+              <a:ext uri="{FF2B5EF4-FFF2-40B4-BE49-F238E27FC236}">
+                <a16:creationId xmlns:a16="http://schemas.microsoft.com/office/drawing/2014/main" id="{C40AFC7F-5EA5-87CD-EEF2-6BDE715C738D}"/>
+              </a:ext>
+            </a:extLst>
+          </p:cNvPr>
+          <p:cNvSpPr>
+            <a:spLocks noGrp="1"/>
+          </p:cNvSpPr>
+          <p:nvPr>
+            <p:ph type="title"/>
+          </p:nvPr>
+        </p:nvSpPr>
+        <p:spPr>
+          <a:xfrm>
+            <a:off x="693605" y="462450"/>
+            <a:ext cx="10515600" cy="1325563"/>
+          </a:xfrm>
+        </p:spPr>
+        <p:txBody>
+          <a:bodyPr/>
+          <a:lstStyle/>
+          <a:p>
+            <a:r>
+              <a:rPr lang="en-US" b="1" dirty="0"/>
+              <a:t>Conditional Inference (</a:t>
+            </a:r>
+            <a:r>
+              <a:rPr lang="en-US" b="1" dirty="0" err="1"/>
+              <a:t>ctree</a:t>
+            </a:r>
+            <a:r>
+              <a:rPr lang="en-US" b="1" dirty="0"/>
+              <a:t>)</a:t>
             </a:r>
             <a:endParaRPr lang="en-US" dirty="0"/>
           </a:p>
         </p:txBody>
       </p:sp>
+      <p:sp>
+        <p:nvSpPr>
+          <p:cNvPr id="11" name="TextBox 10">
+            <a:extLst>
+              <a:ext uri="{FF2B5EF4-FFF2-40B4-BE49-F238E27FC236}">
+                <a16:creationId xmlns:a16="http://schemas.microsoft.com/office/drawing/2014/main" id="{99BAED0E-81C2-C67C-9F14-4EB2793F82AE}"/>
+              </a:ext>
+            </a:extLst>
+          </p:cNvPr>
+          <p:cNvSpPr txBox="1"/>
+          <p:nvPr/>
+        </p:nvSpPr>
+        <p:spPr>
+          <a:xfrm>
+            <a:off x="693604" y="1788013"/>
+            <a:ext cx="9066621" cy="1852815"/>
+          </a:xfrm>
+          <a:prstGeom prst="rect">
+            <a:avLst/>
+          </a:prstGeom>
+          <a:noFill/>
+        </p:spPr>
+        <p:txBody>
+          <a:bodyPr wrap="square" rtlCol="0">
+            <a:spAutoFit/>
+          </a:bodyPr>
+          <a:lstStyle/>
+          <a:p>
+            <a:pPr>
+              <a:lnSpc>
+                <a:spcPct val="200000"/>
+              </a:lnSpc>
+            </a:pPr>
+            <a:r>
+              <a:rPr lang="en-US" sz="2000" b="1" dirty="0"/>
+              <a:t>10-fold Cross-Validation with 10 repeats</a:t>
+            </a:r>
+          </a:p>
+          <a:p>
+            <a:pPr marL="457200" indent="-457200">
+              <a:lnSpc>
+                <a:spcPct val="200000"/>
+              </a:lnSpc>
+              <a:buFont typeface="+mj-lt"/>
+              <a:buAutoNum type="arabicParenR"/>
+            </a:pPr>
+            <a:r>
+              <a:rPr lang="en-US" sz="2000" dirty="0"/>
+              <a:t>Model trained with entire dataset</a:t>
+            </a:r>
+          </a:p>
+          <a:p>
+            <a:pPr marL="457200" indent="-457200">
+              <a:lnSpc>
+                <a:spcPct val="200000"/>
+              </a:lnSpc>
+              <a:buFont typeface="+mj-lt"/>
+              <a:buAutoNum type="arabicParenR"/>
+            </a:pPr>
+            <a:r>
+              <a:rPr lang="en-US" sz="2000" dirty="0"/>
+              <a:t>Model trained in 80% of the data, accuracy tested in 20% holdout </a:t>
+            </a:r>
+          </a:p>
+        </p:txBody>
+      </p:sp>
+    </p:spTree>
+    <p:extLst>
+      <p:ext uri="{BB962C8B-B14F-4D97-AF65-F5344CB8AC3E}">
+        <p14:creationId xmlns:p14="http://schemas.microsoft.com/office/powerpoint/2010/main" val="2386819989"/>
+      </p:ext>
+    </p:extLst>
+  </p:cSld>
+  <p:clrMapOvr>
+    <a:masterClrMapping/>
+  </p:clrMapOvr>
+</p:sld>
+</file>
+
+<file path=ppt/slides/slide14.xml><?xml version="1.0" encoding="utf-8"?>
+<p:sld xmlns:a="http://schemas.openxmlformats.org/drawingml/2006/main" xmlns:r="http://schemas.openxmlformats.org/officeDocument/2006/relationships" xmlns:p="http://schemas.openxmlformats.org/presentationml/2006/main">
+  <p:cSld>
+    <p:spTree>
+      <p:nvGrpSpPr>
+        <p:cNvPr id="1" name=""/>
+        <p:cNvGrpSpPr/>
+        <p:nvPr/>
+      </p:nvGrpSpPr>
+      <p:grpSpPr>
+        <a:xfrm>
+          <a:off x="0" y="0"/>
+          <a:ext cx="0" cy="0"/>
+          <a:chOff x="0" y="0"/>
+          <a:chExt cx="0" cy="0"/>
+        </a:xfrm>
+      </p:grpSpPr>
       <p:pic>
         <p:nvPicPr>
-          <p:cNvPr id="4" name="Picture 3">
-            <a:extLst>
-              <a:ext uri="{FF2B5EF4-FFF2-40B4-BE49-F238E27FC236}">
-                <a16:creationId xmlns:a16="http://schemas.microsoft.com/office/drawing/2014/main" id="{BCDBFE9A-1605-04D4-22E4-2A781A159333}"/>
+          <p:cNvPr id="2" name="Picture 1">
+            <a:extLst>
+              <a:ext uri="{FF2B5EF4-FFF2-40B4-BE49-F238E27FC236}">
+                <a16:creationId xmlns:a16="http://schemas.microsoft.com/office/drawing/2014/main" id="{C4473714-3127-14A0-B9C8-6C63849C423C}"/>
               </a:ext>
             </a:extLst>
           </p:cNvPr>
@@ -3820,20 +4765,206 @@
         </p:blipFill>
         <p:spPr>
           <a:xfrm>
-            <a:off x="838200" y="3782874"/>
-            <a:ext cx="4296159" cy="2025650"/>
+            <a:off x="3659995" y="1177159"/>
+            <a:ext cx="8532005" cy="5247295"/>
           </a:xfrm>
           <a:prstGeom prst="rect">
             <a:avLst/>
           </a:prstGeom>
         </p:spPr>
       </p:pic>
+      <p:sp>
+        <p:nvSpPr>
+          <p:cNvPr id="4" name="TextBox 3">
+            <a:extLst>
+              <a:ext uri="{FF2B5EF4-FFF2-40B4-BE49-F238E27FC236}">
+                <a16:creationId xmlns:a16="http://schemas.microsoft.com/office/drawing/2014/main" id="{20E6FDB1-60BC-85B0-3EA3-09433FA21E59}"/>
+              </a:ext>
+            </a:extLst>
+          </p:cNvPr>
+          <p:cNvSpPr txBox="1"/>
+          <p:nvPr/>
+        </p:nvSpPr>
+        <p:spPr>
+          <a:xfrm>
+            <a:off x="526775" y="1637865"/>
+            <a:ext cx="4955134" cy="2468368"/>
+          </a:xfrm>
+          <a:prstGeom prst="rect">
+            <a:avLst/>
+          </a:prstGeom>
+          <a:noFill/>
+        </p:spPr>
+        <p:txBody>
+          <a:bodyPr wrap="square" rtlCol="0">
+            <a:spAutoFit/>
+          </a:bodyPr>
+          <a:lstStyle/>
+          <a:p>
+            <a:pPr>
+              <a:lnSpc>
+                <a:spcPct val="200000"/>
+              </a:lnSpc>
+            </a:pPr>
+            <a:r>
+              <a:rPr lang="en-US" sz="2000" b="1" dirty="0"/>
+              <a:t>1) Trained with entire dataset (not validated)</a:t>
+            </a:r>
+          </a:p>
+          <a:p>
+            <a:pPr>
+              <a:lnSpc>
+                <a:spcPct val="200000"/>
+              </a:lnSpc>
+            </a:pPr>
+            <a:r>
+              <a:rPr lang="en-US" sz="2000" dirty="0"/>
+              <a:t>Best performance : 03-22 at 50m with PC</a:t>
+            </a:r>
+          </a:p>
+          <a:p>
+            <a:pPr marL="285750" indent="-285750">
+              <a:lnSpc>
+                <a:spcPct val="200000"/>
+              </a:lnSpc>
+              <a:buFont typeface="Arial" panose="020B0604020202020204" pitchFamily="34" charset="0"/>
+              <a:buChar char="•"/>
+            </a:pPr>
+            <a:r>
+              <a:rPr lang="en-US" sz="2000" dirty="0"/>
+              <a:t>Mean accuracy : 85% (</a:t>
+            </a:r>
+            <a:r>
+              <a:rPr lang="en-US" sz="2000" dirty="0" err="1"/>
+              <a:t>sd</a:t>
+            </a:r>
+            <a:r>
+              <a:rPr lang="en-US" sz="2000" dirty="0"/>
+              <a:t>:</a:t>
+            </a:r>
+          </a:p>
+          <a:p>
+            <a:pPr marL="285750" indent="-285750">
+              <a:lnSpc>
+                <a:spcPct val="200000"/>
+              </a:lnSpc>
+              <a:buFont typeface="Arial" panose="020B0604020202020204" pitchFamily="34" charset="0"/>
+              <a:buChar char="•"/>
+            </a:pPr>
+            <a:r>
+              <a:rPr lang="en-US" sz="2000" dirty="0"/>
+              <a:t>Mean Kappa :  80 %  (</a:t>
+            </a:r>
+            <a:r>
+              <a:rPr lang="en-US" sz="2000" dirty="0" err="1"/>
+              <a:t>sd</a:t>
+            </a:r>
+            <a:r>
+              <a:rPr lang="en-US" sz="2000" dirty="0"/>
+              <a:t>: 	</a:t>
+            </a:r>
+          </a:p>
+        </p:txBody>
+      </p:sp>
+      <p:sp>
+        <p:nvSpPr>
+          <p:cNvPr id="8" name="Title 1">
+            <a:extLst>
+              <a:ext uri="{FF2B5EF4-FFF2-40B4-BE49-F238E27FC236}">
+                <a16:creationId xmlns:a16="http://schemas.microsoft.com/office/drawing/2014/main" id="{1A2E2F0C-CB54-5BFD-916D-FC7EB09EA889}"/>
+              </a:ext>
+            </a:extLst>
+          </p:cNvPr>
+          <p:cNvSpPr txBox="1">
+            <a:spLocks/>
+          </p:cNvSpPr>
+          <p:nvPr/>
+        </p:nvSpPr>
+        <p:spPr>
+          <a:xfrm>
+            <a:off x="693605" y="462450"/>
+            <a:ext cx="10515600" cy="1325563"/>
+          </a:xfrm>
+          <a:prstGeom prst="rect">
+            <a:avLst/>
+          </a:prstGeom>
+        </p:spPr>
+        <p:txBody>
+          <a:bodyPr vert="horz" lIns="91440" tIns="45720" rIns="91440" bIns="45720" rtlCol="0" anchor="ctr">
+            <a:normAutofit/>
+          </a:bodyPr>
+          <a:lstStyle>
+            <a:lvl1pPr algn="l" defTabSz="914400" rtl="0" eaLnBrk="1" latinLnBrk="0" hangingPunct="1">
+              <a:lnSpc>
+                <a:spcPct val="90000"/>
+              </a:lnSpc>
+              <a:spcBef>
+                <a:spcPct val="0"/>
+              </a:spcBef>
+              <a:buNone/>
+              <a:defRPr sz="4400" kern="1200">
+                <a:solidFill>
+                  <a:schemeClr val="tx1"/>
+                </a:solidFill>
+                <a:latin typeface="+mj-lt"/>
+                <a:ea typeface="+mj-ea"/>
+                <a:cs typeface="+mj-cs"/>
+              </a:defRPr>
+            </a:lvl1pPr>
+          </a:lstStyle>
+          <a:p>
+            <a:r>
+              <a:rPr lang="en-US" b="1" dirty="0"/>
+              <a:t>Conditional Inference (</a:t>
+            </a:r>
+            <a:r>
+              <a:rPr lang="en-US" b="1" dirty="0" err="1"/>
+              <a:t>ctree</a:t>
+            </a:r>
+            <a:r>
+              <a:rPr lang="en-US" b="1" dirty="0"/>
+              <a:t>)</a:t>
+            </a:r>
+            <a:endParaRPr lang="en-US" dirty="0"/>
+          </a:p>
+        </p:txBody>
+      </p:sp>
+    </p:spTree>
+    <p:extLst>
+      <p:ext uri="{BB962C8B-B14F-4D97-AF65-F5344CB8AC3E}">
+        <p14:creationId xmlns:p14="http://schemas.microsoft.com/office/powerpoint/2010/main" val="1696135541"/>
+      </p:ext>
+    </p:extLst>
+  </p:cSld>
+  <p:clrMapOvr>
+    <a:masterClrMapping/>
+  </p:clrMapOvr>
+</p:sld>
+</file>
+
+<file path=ppt/slides/slide15.xml><?xml version="1.0" encoding="utf-8"?>
+<p:sld xmlns:a="http://schemas.openxmlformats.org/drawingml/2006/main" xmlns:r="http://schemas.openxmlformats.org/officeDocument/2006/relationships" xmlns:p="http://schemas.openxmlformats.org/presentationml/2006/main">
+  <p:cSld>
+    <p:spTree>
+      <p:nvGrpSpPr>
+        <p:cNvPr id="1" name=""/>
+        <p:cNvGrpSpPr/>
+        <p:nvPr/>
+      </p:nvGrpSpPr>
+      <p:grpSpPr>
+        <a:xfrm>
+          <a:off x="0" y="0"/>
+          <a:ext cx="0" cy="0"/>
+          <a:chOff x="0" y="0"/>
+          <a:chExt cx="0" cy="0"/>
+        </a:xfrm>
+      </p:grpSpPr>
       <p:pic>
         <p:nvPicPr>
-          <p:cNvPr id="6" name="Picture 5">
-            <a:extLst>
-              <a:ext uri="{FF2B5EF4-FFF2-40B4-BE49-F238E27FC236}">
-                <a16:creationId xmlns:a16="http://schemas.microsoft.com/office/drawing/2014/main" id="{F7DF4AC8-3AA8-56D0-9DFC-8676F46F3984}"/>
+          <p:cNvPr id="2" name="Picture 1">
+            <a:extLst>
+              <a:ext uri="{FF2B5EF4-FFF2-40B4-BE49-F238E27FC236}">
+                <a16:creationId xmlns:a16="http://schemas.microsoft.com/office/drawing/2014/main" id="{C4473714-3127-14A0-B9C8-6C63849C423C}"/>
               </a:ext>
             </a:extLst>
           </p:cNvPr>
@@ -3843,25 +4974,529 @@
           <p:nvPr/>
         </p:nvPicPr>
         <p:blipFill>
-          <a:blip r:embed="rId3"/>
+          <a:blip r:embed="rId2"/>
           <a:stretch>
             <a:fillRect/>
           </a:stretch>
         </p:blipFill>
         <p:spPr>
           <a:xfrm>
-            <a:off x="6380162" y="1073011"/>
-            <a:ext cx="5172075" cy="4781550"/>
+            <a:off x="3659995" y="1177159"/>
+            <a:ext cx="8532005" cy="5247295"/>
           </a:xfrm>
           <a:prstGeom prst="rect">
             <a:avLst/>
           </a:prstGeom>
         </p:spPr>
       </p:pic>
+      <p:sp>
+        <p:nvSpPr>
+          <p:cNvPr id="4" name="TextBox 3">
+            <a:extLst>
+              <a:ext uri="{FF2B5EF4-FFF2-40B4-BE49-F238E27FC236}">
+                <a16:creationId xmlns:a16="http://schemas.microsoft.com/office/drawing/2014/main" id="{20E6FDB1-60BC-85B0-3EA3-09433FA21E59}"/>
+              </a:ext>
+            </a:extLst>
+          </p:cNvPr>
+          <p:cNvSpPr txBox="1"/>
+          <p:nvPr/>
+        </p:nvSpPr>
+        <p:spPr>
+          <a:xfrm>
+            <a:off x="526775" y="1637865"/>
+            <a:ext cx="4955134" cy="3083921"/>
+          </a:xfrm>
+          <a:prstGeom prst="rect">
+            <a:avLst/>
+          </a:prstGeom>
+          <a:noFill/>
+        </p:spPr>
+        <p:txBody>
+          <a:bodyPr wrap="square" rtlCol="0">
+            <a:spAutoFit/>
+          </a:bodyPr>
+          <a:lstStyle/>
+          <a:p>
+            <a:pPr>
+              <a:lnSpc>
+                <a:spcPct val="200000"/>
+              </a:lnSpc>
+            </a:pPr>
+            <a:r>
+              <a:rPr lang="en-US" sz="2000" b="1" dirty="0"/>
+              <a:t>2) Trained in 80% of the data, accuracy tested in 20% holdout </a:t>
+            </a:r>
+          </a:p>
+          <a:p>
+            <a:pPr>
+              <a:lnSpc>
+                <a:spcPct val="200000"/>
+              </a:lnSpc>
+            </a:pPr>
+            <a:r>
+              <a:rPr lang="en-US" sz="2000" dirty="0"/>
+              <a:t>Best performance : 03-22 at 50m with PC</a:t>
+            </a:r>
+          </a:p>
+          <a:p>
+            <a:pPr marL="285750" indent="-285750">
+              <a:lnSpc>
+                <a:spcPct val="200000"/>
+              </a:lnSpc>
+              <a:buFont typeface="Arial" panose="020B0604020202020204" pitchFamily="34" charset="0"/>
+              <a:buChar char="•"/>
+            </a:pPr>
+            <a:r>
+              <a:rPr lang="en-US" sz="2000" dirty="0"/>
+              <a:t>Mean accuracy : 85% (</a:t>
+            </a:r>
+            <a:r>
+              <a:rPr lang="en-US" sz="2000" dirty="0" err="1"/>
+              <a:t>sd</a:t>
+            </a:r>
+            <a:r>
+              <a:rPr lang="en-US" sz="2000" dirty="0"/>
+              <a:t>:</a:t>
+            </a:r>
+          </a:p>
+          <a:p>
+            <a:pPr marL="285750" indent="-285750">
+              <a:lnSpc>
+                <a:spcPct val="200000"/>
+              </a:lnSpc>
+              <a:buFont typeface="Arial" panose="020B0604020202020204" pitchFamily="34" charset="0"/>
+              <a:buChar char="•"/>
+            </a:pPr>
+            <a:r>
+              <a:rPr lang="en-US" sz="2000" dirty="0"/>
+              <a:t>Mean Kappa :  80 %  (</a:t>
+            </a:r>
+            <a:r>
+              <a:rPr lang="en-US" sz="2000" dirty="0" err="1"/>
+              <a:t>sd</a:t>
+            </a:r>
+            <a:r>
+              <a:rPr lang="en-US" sz="2000" dirty="0"/>
+              <a:t>: 	</a:t>
+            </a:r>
+          </a:p>
+        </p:txBody>
+      </p:sp>
+      <p:sp>
+        <p:nvSpPr>
+          <p:cNvPr id="8" name="Title 1">
+            <a:extLst>
+              <a:ext uri="{FF2B5EF4-FFF2-40B4-BE49-F238E27FC236}">
+                <a16:creationId xmlns:a16="http://schemas.microsoft.com/office/drawing/2014/main" id="{1A2E2F0C-CB54-5BFD-916D-FC7EB09EA889}"/>
+              </a:ext>
+            </a:extLst>
+          </p:cNvPr>
+          <p:cNvSpPr txBox="1">
+            <a:spLocks/>
+          </p:cNvSpPr>
+          <p:nvPr/>
+        </p:nvSpPr>
+        <p:spPr>
+          <a:xfrm>
+            <a:off x="693605" y="462450"/>
+            <a:ext cx="10515600" cy="1325563"/>
+          </a:xfrm>
+          <a:prstGeom prst="rect">
+            <a:avLst/>
+          </a:prstGeom>
+        </p:spPr>
+        <p:txBody>
+          <a:bodyPr vert="horz" lIns="91440" tIns="45720" rIns="91440" bIns="45720" rtlCol="0" anchor="ctr">
+            <a:normAutofit/>
+          </a:bodyPr>
+          <a:lstStyle>
+            <a:lvl1pPr algn="l" defTabSz="914400" rtl="0" eaLnBrk="1" latinLnBrk="0" hangingPunct="1">
+              <a:lnSpc>
+                <a:spcPct val="90000"/>
+              </a:lnSpc>
+              <a:spcBef>
+                <a:spcPct val="0"/>
+              </a:spcBef>
+              <a:buNone/>
+              <a:defRPr sz="4400" kern="1200">
+                <a:solidFill>
+                  <a:schemeClr val="tx1"/>
+                </a:solidFill>
+                <a:latin typeface="+mj-lt"/>
+                <a:ea typeface="+mj-ea"/>
+                <a:cs typeface="+mj-cs"/>
+              </a:defRPr>
+            </a:lvl1pPr>
+          </a:lstStyle>
+          <a:p>
+            <a:r>
+              <a:rPr lang="en-US" b="1" dirty="0"/>
+              <a:t>Conditional Inference (</a:t>
+            </a:r>
+            <a:r>
+              <a:rPr lang="en-US" b="1" dirty="0" err="1"/>
+              <a:t>ctree</a:t>
+            </a:r>
+            <a:r>
+              <a:rPr lang="en-US" b="1" dirty="0"/>
+              <a:t>)</a:t>
+            </a:r>
+            <a:endParaRPr lang="en-US" dirty="0"/>
+          </a:p>
+        </p:txBody>
+      </p:sp>
     </p:spTree>
     <p:extLst>
       <p:ext uri="{BB962C8B-B14F-4D97-AF65-F5344CB8AC3E}">
-        <p14:creationId xmlns:p14="http://schemas.microsoft.com/office/powerpoint/2010/main" val="2852343294"/>
+        <p14:creationId xmlns:p14="http://schemas.microsoft.com/office/powerpoint/2010/main" val="3356519008"/>
+      </p:ext>
+    </p:extLst>
+  </p:cSld>
+  <p:clrMapOvr>
+    <a:masterClrMapping/>
+  </p:clrMapOvr>
+</p:sld>
+</file>
+
+<file path=ppt/slides/slide16.xml><?xml version="1.0" encoding="utf-8"?>
+<p:sld xmlns:a="http://schemas.openxmlformats.org/drawingml/2006/main" xmlns:r="http://schemas.openxmlformats.org/officeDocument/2006/relationships" xmlns:p="http://schemas.openxmlformats.org/presentationml/2006/main">
+  <p:cSld>
+    <p:spTree>
+      <p:nvGrpSpPr>
+        <p:cNvPr id="1" name=""/>
+        <p:cNvGrpSpPr/>
+        <p:nvPr/>
+      </p:nvGrpSpPr>
+      <p:grpSpPr>
+        <a:xfrm>
+          <a:off x="0" y="0"/>
+          <a:ext cx="0" cy="0"/>
+          <a:chOff x="0" y="0"/>
+          <a:chExt cx="0" cy="0"/>
+        </a:xfrm>
+      </p:grpSpPr>
+      <p:pic>
+        <p:nvPicPr>
+          <p:cNvPr id="3" name="Picture 2">
+            <a:extLst>
+              <a:ext uri="{FF2B5EF4-FFF2-40B4-BE49-F238E27FC236}">
+                <a16:creationId xmlns:a16="http://schemas.microsoft.com/office/drawing/2014/main" id="{04988A35-2B1C-DA5E-D94A-F20B88D17605}"/>
+              </a:ext>
+            </a:extLst>
+          </p:cNvPr>
+          <p:cNvPicPr>
+            <a:picLocks noChangeAspect="1"/>
+          </p:cNvPicPr>
+          <p:nvPr/>
+        </p:nvPicPr>
+        <p:blipFill>
+          <a:blip r:embed="rId2"/>
+          <a:stretch>
+            <a:fillRect/>
+          </a:stretch>
+        </p:blipFill>
+        <p:spPr>
+          <a:xfrm>
+            <a:off x="4262977" y="814213"/>
+            <a:ext cx="7929023" cy="5946767"/>
+          </a:xfrm>
+          <a:prstGeom prst="rect">
+            <a:avLst/>
+          </a:prstGeom>
+        </p:spPr>
+      </p:pic>
+      <p:sp>
+        <p:nvSpPr>
+          <p:cNvPr id="2" name="Title 1">
+            <a:extLst>
+              <a:ext uri="{FF2B5EF4-FFF2-40B4-BE49-F238E27FC236}">
+                <a16:creationId xmlns:a16="http://schemas.microsoft.com/office/drawing/2014/main" id="{9436E8AB-C561-2FCA-0265-5CB6416C4D16}"/>
+              </a:ext>
+            </a:extLst>
+          </p:cNvPr>
+          <p:cNvSpPr>
+            <a:spLocks noGrp="1"/>
+          </p:cNvSpPr>
+          <p:nvPr>
+            <p:ph type="title"/>
+          </p:nvPr>
+        </p:nvSpPr>
+        <p:spPr/>
+        <p:txBody>
+          <a:bodyPr/>
+          <a:lstStyle/>
+          <a:p>
+            <a:r>
+              <a:rPr lang="es-ES" b="1" dirty="0" err="1"/>
+              <a:t>Random</a:t>
+            </a:r>
+            <a:r>
+              <a:rPr lang="es-ES" b="1" dirty="0"/>
+              <a:t> </a:t>
+            </a:r>
+            <a:r>
+              <a:rPr lang="es-ES" b="1" dirty="0" err="1"/>
+              <a:t>Forests</a:t>
+            </a:r>
+            <a:endParaRPr lang="en-US" b="1" dirty="0"/>
+          </a:p>
+        </p:txBody>
+      </p:sp>
+      <p:sp>
+        <p:nvSpPr>
+          <p:cNvPr id="6" name="TextBox 5">
+            <a:extLst>
+              <a:ext uri="{FF2B5EF4-FFF2-40B4-BE49-F238E27FC236}">
+                <a16:creationId xmlns:a16="http://schemas.microsoft.com/office/drawing/2014/main" id="{52A5B92E-70CA-DAC2-485F-85B149E59375}"/>
+              </a:ext>
+            </a:extLst>
+          </p:cNvPr>
+          <p:cNvSpPr txBox="1"/>
+          <p:nvPr/>
+        </p:nvSpPr>
+        <p:spPr>
+          <a:xfrm>
+            <a:off x="572891" y="1757466"/>
+            <a:ext cx="5228819" cy="2468368"/>
+          </a:xfrm>
+          <a:prstGeom prst="rect">
+            <a:avLst/>
+          </a:prstGeom>
+          <a:noFill/>
+        </p:spPr>
+        <p:txBody>
+          <a:bodyPr wrap="square" rtlCol="0">
+            <a:spAutoFit/>
+          </a:bodyPr>
+          <a:lstStyle/>
+          <a:p>
+            <a:pPr>
+              <a:lnSpc>
+                <a:spcPct val="200000"/>
+              </a:lnSpc>
+            </a:pPr>
+            <a:r>
+              <a:rPr lang="en-US" sz="2000" b="1" dirty="0"/>
+              <a:t>70 - 30 % train - test split</a:t>
+            </a:r>
+            <a:endParaRPr lang="en-US" sz="2000" dirty="0"/>
+          </a:p>
+          <a:p>
+            <a:pPr>
+              <a:lnSpc>
+                <a:spcPct val="200000"/>
+              </a:lnSpc>
+            </a:pPr>
+            <a:r>
+              <a:rPr lang="en-US" sz="2000" dirty="0"/>
+              <a:t>5000 trees</a:t>
+            </a:r>
+          </a:p>
+          <a:p>
+            <a:pPr>
+              <a:lnSpc>
+                <a:spcPct val="200000"/>
+              </a:lnSpc>
+            </a:pPr>
+            <a:r>
+              <a:rPr lang="en-US" sz="2000" dirty="0"/>
+              <a:t>Best performance :</a:t>
+            </a:r>
+          </a:p>
+          <a:p>
+            <a:pPr>
+              <a:lnSpc>
+                <a:spcPct val="200000"/>
+              </a:lnSpc>
+            </a:pPr>
+            <a:r>
+              <a:rPr lang="en-US" sz="2000" dirty="0"/>
+              <a:t>03-22 at 50m without PC</a:t>
+            </a:r>
+          </a:p>
+        </p:txBody>
+      </p:sp>
+    </p:spTree>
+    <p:extLst>
+      <p:ext uri="{BB962C8B-B14F-4D97-AF65-F5344CB8AC3E}">
+        <p14:creationId xmlns:p14="http://schemas.microsoft.com/office/powerpoint/2010/main" val="1422733971"/>
+      </p:ext>
+    </p:extLst>
+  </p:cSld>
+  <p:clrMapOvr>
+    <a:masterClrMapping/>
+  </p:clrMapOvr>
+</p:sld>
+</file>
+
+<file path=ppt/slides/slide17.xml><?xml version="1.0" encoding="utf-8"?>
+<p:sld xmlns:a="http://schemas.openxmlformats.org/drawingml/2006/main" xmlns:r="http://schemas.openxmlformats.org/officeDocument/2006/relationships" xmlns:p="http://schemas.openxmlformats.org/presentationml/2006/main">
+  <p:cSld>
+    <p:spTree>
+      <p:nvGrpSpPr>
+        <p:cNvPr id="1" name=""/>
+        <p:cNvGrpSpPr/>
+        <p:nvPr/>
+      </p:nvGrpSpPr>
+      <p:grpSpPr>
+        <a:xfrm>
+          <a:off x="0" y="0"/>
+          <a:ext cx="0" cy="0"/>
+          <a:chOff x="0" y="0"/>
+          <a:chExt cx="0" cy="0"/>
+        </a:xfrm>
+      </p:grpSpPr>
+      <p:pic>
+        <p:nvPicPr>
+          <p:cNvPr id="5" name="Picture 4" descr="Chart, scatter chart&#10;&#10;Description automatically generated">
+            <a:extLst>
+              <a:ext uri="{FF2B5EF4-FFF2-40B4-BE49-F238E27FC236}">
+                <a16:creationId xmlns:a16="http://schemas.microsoft.com/office/drawing/2014/main" id="{E9B97A04-774B-6EE6-36A8-B2648B791E42}"/>
+              </a:ext>
+            </a:extLst>
+          </p:cNvPr>
+          <p:cNvPicPr>
+            <a:picLocks noChangeAspect="1"/>
+          </p:cNvPicPr>
+          <p:nvPr/>
+        </p:nvPicPr>
+        <p:blipFill>
+          <a:blip r:embed="rId2">
+            <a:extLst>
+              <a:ext uri="{28A0092B-C50C-407E-A947-70E740481C1C}">
+                <a14:useLocalDpi xmlns:a14="http://schemas.microsoft.com/office/drawing/2010/main" val="0"/>
+              </a:ext>
+            </a:extLst>
+          </a:blip>
+          <a:stretch>
+            <a:fillRect/>
+          </a:stretch>
+        </p:blipFill>
+        <p:spPr>
+          <a:xfrm>
+            <a:off x="4414338" y="870251"/>
+            <a:ext cx="7315215" cy="5486411"/>
+          </a:xfrm>
+          <a:prstGeom prst="rect">
+            <a:avLst/>
+          </a:prstGeom>
+        </p:spPr>
+      </p:pic>
+      <p:sp>
+        <p:nvSpPr>
+          <p:cNvPr id="2" name="Title 1">
+            <a:extLst>
+              <a:ext uri="{FF2B5EF4-FFF2-40B4-BE49-F238E27FC236}">
+                <a16:creationId xmlns:a16="http://schemas.microsoft.com/office/drawing/2014/main" id="{9436E8AB-C561-2FCA-0265-5CB6416C4D16}"/>
+              </a:ext>
+            </a:extLst>
+          </p:cNvPr>
+          <p:cNvSpPr>
+            <a:spLocks noGrp="1"/>
+          </p:cNvSpPr>
+          <p:nvPr>
+            <p:ph type="title"/>
+          </p:nvPr>
+        </p:nvSpPr>
+        <p:spPr/>
+        <p:txBody>
+          <a:bodyPr/>
+          <a:lstStyle/>
+          <a:p>
+            <a:r>
+              <a:rPr lang="es-ES" b="1" dirty="0" err="1"/>
+              <a:t>Random</a:t>
+            </a:r>
+            <a:r>
+              <a:rPr lang="es-ES" b="1" dirty="0"/>
+              <a:t> </a:t>
+            </a:r>
+            <a:r>
+              <a:rPr lang="es-ES" b="1" dirty="0" err="1"/>
+              <a:t>Forests</a:t>
+            </a:r>
+            <a:endParaRPr lang="en-US" b="1" dirty="0"/>
+          </a:p>
+        </p:txBody>
+      </p:sp>
+      <p:sp>
+        <p:nvSpPr>
+          <p:cNvPr id="7" name="TextBox 6">
+            <a:extLst>
+              <a:ext uri="{FF2B5EF4-FFF2-40B4-BE49-F238E27FC236}">
+                <a16:creationId xmlns:a16="http://schemas.microsoft.com/office/drawing/2014/main" id="{048F93AD-7EFE-4873-9FEF-50E0F31AA337}"/>
+              </a:ext>
+            </a:extLst>
+          </p:cNvPr>
+          <p:cNvSpPr txBox="1"/>
+          <p:nvPr/>
+        </p:nvSpPr>
+        <p:spPr>
+          <a:xfrm>
+            <a:off x="572891" y="1757466"/>
+            <a:ext cx="5228819" cy="2468368"/>
+          </a:xfrm>
+          <a:prstGeom prst="rect">
+            <a:avLst/>
+          </a:prstGeom>
+          <a:noFill/>
+        </p:spPr>
+        <p:txBody>
+          <a:bodyPr wrap="square" rtlCol="0">
+            <a:spAutoFit/>
+          </a:bodyPr>
+          <a:lstStyle/>
+          <a:p>
+            <a:pPr>
+              <a:lnSpc>
+                <a:spcPct val="200000"/>
+              </a:lnSpc>
+            </a:pPr>
+            <a:r>
+              <a:rPr lang="en-US" sz="2000" b="1" dirty="0"/>
+              <a:t>70 - 30 % train - test split</a:t>
+            </a:r>
+            <a:endParaRPr lang="en-US" sz="2000" dirty="0"/>
+          </a:p>
+          <a:p>
+            <a:pPr>
+              <a:lnSpc>
+                <a:spcPct val="200000"/>
+              </a:lnSpc>
+            </a:pPr>
+            <a:r>
+              <a:rPr lang="en-US" sz="2000" dirty="0"/>
+              <a:t>5000 trees</a:t>
+            </a:r>
+          </a:p>
+          <a:p>
+            <a:pPr>
+              <a:lnSpc>
+                <a:spcPct val="200000"/>
+              </a:lnSpc>
+            </a:pPr>
+            <a:r>
+              <a:rPr lang="en-US" sz="2000" dirty="0"/>
+              <a:t>Best performance :</a:t>
+            </a:r>
+          </a:p>
+          <a:p>
+            <a:pPr>
+              <a:lnSpc>
+                <a:spcPct val="200000"/>
+              </a:lnSpc>
+            </a:pPr>
+            <a:r>
+              <a:rPr lang="en-US" sz="2000" dirty="0"/>
+              <a:t>03-22 at 50m without PC</a:t>
+            </a:r>
+          </a:p>
+        </p:txBody>
+      </p:sp>
+    </p:spTree>
+    <p:extLst>
+      <p:ext uri="{BB962C8B-B14F-4D97-AF65-F5344CB8AC3E}">
+        <p14:creationId xmlns:p14="http://schemas.microsoft.com/office/powerpoint/2010/main" val="3389449928"/>
       </p:ext>
     </p:extLst>
   </p:cSld>
@@ -3888,223 +5523,202 @@
           <a:chExt cx="0" cy="0"/>
         </a:xfrm>
       </p:grpSpPr>
-      <p:grpSp>
-        <p:nvGrpSpPr>
-          <p:cNvPr id="7" name="Group 6">
-            <a:extLst>
-              <a:ext uri="{FF2B5EF4-FFF2-40B4-BE49-F238E27FC236}">
-                <a16:creationId xmlns:a16="http://schemas.microsoft.com/office/drawing/2014/main" id="{7C62935E-80B3-C015-BA1A-DFB7AB842B64}"/>
-              </a:ext>
-            </a:extLst>
-          </p:cNvPr>
-          <p:cNvGrpSpPr/>
+      <p:pic>
+        <p:nvPicPr>
+          <p:cNvPr id="3" name="Picture 2" descr="Chart, box and whisker chart&#10;&#10;Description automatically generated">
+            <a:extLst>
+              <a:ext uri="{FF2B5EF4-FFF2-40B4-BE49-F238E27FC236}">
+                <a16:creationId xmlns:a16="http://schemas.microsoft.com/office/drawing/2014/main" id="{FB2D6238-2909-7820-887C-E8F96409B54B}"/>
+              </a:ext>
+            </a:extLst>
+          </p:cNvPr>
+          <p:cNvPicPr>
+            <a:picLocks noChangeAspect="1"/>
+          </p:cNvPicPr>
           <p:nvPr/>
-        </p:nvGrpSpPr>
-        <p:grpSpPr>
+        </p:nvPicPr>
+        <p:blipFill>
+          <a:blip r:embed="rId2">
+            <a:extLst>
+              <a:ext uri="{28A0092B-C50C-407E-A947-70E740481C1C}">
+                <a14:useLocalDpi xmlns:a14="http://schemas.microsoft.com/office/drawing/2010/main" val="0"/>
+              </a:ext>
+            </a:extLst>
+          </a:blip>
+          <a:stretch>
+            <a:fillRect/>
+          </a:stretch>
+        </p:blipFill>
+        <p:spPr>
           <a:xfrm>
-            <a:off x="1778000" y="190500"/>
-            <a:ext cx="8483600" cy="6362700"/>
-            <a:chOff x="1778000" y="190500"/>
-            <a:chExt cx="8483600" cy="6362700"/>
+            <a:off x="1746603" y="166952"/>
+            <a:ext cx="8698794" cy="6524095"/>
           </a:xfrm>
-        </p:grpSpPr>
-        <p:pic>
-          <p:nvPicPr>
-            <p:cNvPr id="3" name="Picture 2" descr="Chart, box and whisker chart&#10;&#10;Description automatically generated">
-              <a:extLst>
-                <a:ext uri="{FF2B5EF4-FFF2-40B4-BE49-F238E27FC236}">
-                  <a16:creationId xmlns:a16="http://schemas.microsoft.com/office/drawing/2014/main" id="{C2D8F168-91DD-C448-D980-B2C084461699}"/>
-                </a:ext>
-              </a:extLst>
-            </p:cNvPr>
-            <p:cNvPicPr>
-              <a:picLocks noChangeAspect="1"/>
-            </p:cNvPicPr>
-            <p:nvPr/>
-          </p:nvPicPr>
-          <p:blipFill>
-            <a:blip r:embed="rId2">
-              <a:extLst>
-                <a:ext uri="{28A0092B-C50C-407E-A947-70E740481C1C}">
-                  <a14:useLocalDpi xmlns:a14="http://schemas.microsoft.com/office/drawing/2010/main" val="0"/>
-                </a:ext>
-              </a:extLst>
-            </a:blip>
-            <a:stretch>
-              <a:fillRect/>
-            </a:stretch>
-          </p:blipFill>
-          <p:spPr>
-            <a:xfrm>
-              <a:off x="1778000" y="190500"/>
-              <a:ext cx="8483600" cy="6362700"/>
-            </a:xfrm>
-            <a:prstGeom prst="rect">
-              <a:avLst/>
-            </a:prstGeom>
-          </p:spPr>
-        </p:pic>
-        <p:sp>
-          <p:nvSpPr>
-            <p:cNvPr id="4" name="Rectangle 3">
-              <a:extLst>
-                <a:ext uri="{FF2B5EF4-FFF2-40B4-BE49-F238E27FC236}">
-                  <a16:creationId xmlns:a16="http://schemas.microsoft.com/office/drawing/2014/main" id="{47EB5844-6E11-6C95-7290-B51CA2ABCFBB}"/>
-                </a:ext>
-              </a:extLst>
-            </p:cNvPr>
-            <p:cNvSpPr/>
-            <p:nvPr/>
-          </p:nvSpPr>
-          <p:spPr>
-            <a:xfrm>
-              <a:off x="2336800" y="1638300"/>
-              <a:ext cx="406400" cy="4152900"/>
-            </a:xfrm>
-            <a:prstGeom prst="rect">
-              <a:avLst/>
-            </a:prstGeom>
-            <a:noFill/>
-            <a:ln>
-              <a:solidFill>
-                <a:srgbClr val="FF0000"/>
-              </a:solidFill>
-            </a:ln>
-          </p:spPr>
-          <p:style>
-            <a:lnRef idx="2">
-              <a:schemeClr val="accent1">
-                <a:shade val="50000"/>
-              </a:schemeClr>
-            </a:lnRef>
-            <a:fillRef idx="1">
-              <a:schemeClr val="accent1"/>
-            </a:fillRef>
-            <a:effectRef idx="0">
-              <a:schemeClr val="accent1"/>
-            </a:effectRef>
-            <a:fontRef idx="minor">
-              <a:schemeClr val="lt1"/>
-            </a:fontRef>
-          </p:style>
-          <p:txBody>
-            <a:bodyPr rtlCol="0" anchor="ctr"/>
-            <a:lstStyle/>
-            <a:p>
-              <a:pPr algn="ctr"/>
-              <a:endParaRPr lang="en-US"/>
-            </a:p>
-          </p:txBody>
-        </p:sp>
-        <p:sp>
-          <p:nvSpPr>
-            <p:cNvPr id="5" name="Rectangle 4">
-              <a:extLst>
-                <a:ext uri="{FF2B5EF4-FFF2-40B4-BE49-F238E27FC236}">
-                  <a16:creationId xmlns:a16="http://schemas.microsoft.com/office/drawing/2014/main" id="{A18608D6-B16F-3107-80A8-1264A1E360BC}"/>
-                </a:ext>
-              </a:extLst>
-            </p:cNvPr>
-            <p:cNvSpPr/>
-            <p:nvPr/>
-          </p:nvSpPr>
-          <p:spPr>
-            <a:xfrm>
-              <a:off x="4699000" y="1638300"/>
-              <a:ext cx="406400" cy="4152900"/>
-            </a:xfrm>
-            <a:prstGeom prst="rect">
-              <a:avLst/>
-            </a:prstGeom>
-            <a:noFill/>
-            <a:ln>
-              <a:solidFill>
-                <a:srgbClr val="FF0000"/>
-              </a:solidFill>
-            </a:ln>
-          </p:spPr>
-          <p:style>
-            <a:lnRef idx="2">
-              <a:schemeClr val="accent1">
-                <a:shade val="50000"/>
-              </a:schemeClr>
-            </a:lnRef>
-            <a:fillRef idx="1">
-              <a:schemeClr val="accent1"/>
-            </a:fillRef>
-            <a:effectRef idx="0">
-              <a:schemeClr val="accent1"/>
-            </a:effectRef>
-            <a:fontRef idx="minor">
-              <a:schemeClr val="lt1"/>
-            </a:fontRef>
-          </p:style>
-          <p:txBody>
-            <a:bodyPr rtlCol="0" anchor="ctr"/>
-            <a:lstStyle/>
-            <a:p>
-              <a:pPr algn="ctr"/>
-              <a:endParaRPr lang="en-US"/>
-            </a:p>
-          </p:txBody>
-        </p:sp>
-        <p:sp>
-          <p:nvSpPr>
-            <p:cNvPr id="6" name="Rectangle 5">
-              <a:extLst>
-                <a:ext uri="{FF2B5EF4-FFF2-40B4-BE49-F238E27FC236}">
-                  <a16:creationId xmlns:a16="http://schemas.microsoft.com/office/drawing/2014/main" id="{4F8410E7-5226-D2E4-53C1-E5191A0F2665}"/>
-                </a:ext>
-              </a:extLst>
-            </p:cNvPr>
-            <p:cNvSpPr/>
-            <p:nvPr/>
-          </p:nvSpPr>
-          <p:spPr>
-            <a:xfrm>
-              <a:off x="7061200" y="1511300"/>
-              <a:ext cx="406400" cy="4279900"/>
-            </a:xfrm>
-            <a:prstGeom prst="rect">
-              <a:avLst/>
-            </a:prstGeom>
-            <a:noFill/>
-            <a:ln>
-              <a:solidFill>
-                <a:srgbClr val="FF0000"/>
-              </a:solidFill>
-            </a:ln>
-          </p:spPr>
-          <p:style>
-            <a:lnRef idx="2">
-              <a:schemeClr val="accent1">
-                <a:shade val="50000"/>
-              </a:schemeClr>
-            </a:lnRef>
-            <a:fillRef idx="1">
-              <a:schemeClr val="accent1"/>
-            </a:fillRef>
-            <a:effectRef idx="0">
-              <a:schemeClr val="accent1"/>
-            </a:effectRef>
-            <a:fontRef idx="minor">
-              <a:schemeClr val="lt1"/>
-            </a:fontRef>
-          </p:style>
-          <p:txBody>
-            <a:bodyPr rtlCol="0" anchor="ctr"/>
-            <a:lstStyle/>
-            <a:p>
-              <a:pPr algn="ctr"/>
-              <a:endParaRPr lang="en-US"/>
-            </a:p>
-          </p:txBody>
-        </p:sp>
-      </p:grpSp>
+          <a:prstGeom prst="rect">
+            <a:avLst/>
+          </a:prstGeom>
+        </p:spPr>
+      </p:pic>
+      <p:sp>
+        <p:nvSpPr>
+          <p:cNvPr id="4" name="Rectangle 3">
+            <a:extLst>
+              <a:ext uri="{FF2B5EF4-FFF2-40B4-BE49-F238E27FC236}">
+                <a16:creationId xmlns:a16="http://schemas.microsoft.com/office/drawing/2014/main" id="{97D056CA-03C2-0D6C-64E1-9D18DD871326}"/>
+              </a:ext>
+            </a:extLst>
+          </p:cNvPr>
+          <p:cNvSpPr/>
+          <p:nvPr/>
+        </p:nvSpPr>
+        <p:spPr>
+          <a:xfrm>
+            <a:off x="2295703" y="1217060"/>
+            <a:ext cx="406400" cy="4152900"/>
+          </a:xfrm>
+          <a:prstGeom prst="rect">
+            <a:avLst/>
+          </a:prstGeom>
+          <a:noFill/>
+          <a:ln>
+            <a:solidFill>
+              <a:srgbClr val="FF0000"/>
+            </a:solidFill>
+          </a:ln>
+        </p:spPr>
+        <p:style>
+          <a:lnRef idx="2">
+            <a:schemeClr val="accent1">
+              <a:shade val="50000"/>
+            </a:schemeClr>
+          </a:lnRef>
+          <a:fillRef idx="1">
+            <a:schemeClr val="accent1"/>
+          </a:fillRef>
+          <a:effectRef idx="0">
+            <a:schemeClr val="accent1"/>
+          </a:effectRef>
+          <a:fontRef idx="minor">
+            <a:schemeClr val="lt1"/>
+          </a:fontRef>
+        </p:style>
+        <p:txBody>
+          <a:bodyPr rtlCol="0" anchor="ctr"/>
+          <a:lstStyle/>
+          <a:p>
+            <a:pPr algn="ctr"/>
+            <a:endParaRPr lang="en-US"/>
+          </a:p>
+        </p:txBody>
+      </p:sp>
+      <p:sp>
+        <p:nvSpPr>
+          <p:cNvPr id="5" name="Rectangle 4">
+            <a:extLst>
+              <a:ext uri="{FF2B5EF4-FFF2-40B4-BE49-F238E27FC236}">
+                <a16:creationId xmlns:a16="http://schemas.microsoft.com/office/drawing/2014/main" id="{9D55DCB2-0A03-0B6D-5AC8-03FCB27CC864}"/>
+              </a:ext>
+            </a:extLst>
+          </p:cNvPr>
+          <p:cNvSpPr/>
+          <p:nvPr/>
+        </p:nvSpPr>
+        <p:spPr>
+          <a:xfrm>
+            <a:off x="4728966" y="1133154"/>
+            <a:ext cx="406400" cy="4152900"/>
+          </a:xfrm>
+          <a:prstGeom prst="rect">
+            <a:avLst/>
+          </a:prstGeom>
+          <a:noFill/>
+          <a:ln>
+            <a:solidFill>
+              <a:srgbClr val="FF0000"/>
+            </a:solidFill>
+          </a:ln>
+        </p:spPr>
+        <p:style>
+          <a:lnRef idx="2">
+            <a:schemeClr val="accent1">
+              <a:shade val="50000"/>
+            </a:schemeClr>
+          </a:lnRef>
+          <a:fillRef idx="1">
+            <a:schemeClr val="accent1"/>
+          </a:fillRef>
+          <a:effectRef idx="0">
+            <a:schemeClr val="accent1"/>
+          </a:effectRef>
+          <a:fontRef idx="minor">
+            <a:schemeClr val="lt1"/>
+          </a:fontRef>
+        </p:style>
+        <p:txBody>
+          <a:bodyPr rtlCol="0" anchor="ctr"/>
+          <a:lstStyle/>
+          <a:p>
+            <a:pPr algn="ctr"/>
+            <a:endParaRPr lang="en-US"/>
+          </a:p>
+        </p:txBody>
+      </p:sp>
+      <p:sp>
+        <p:nvSpPr>
+          <p:cNvPr id="6" name="Rectangle 5">
+            <a:extLst>
+              <a:ext uri="{FF2B5EF4-FFF2-40B4-BE49-F238E27FC236}">
+                <a16:creationId xmlns:a16="http://schemas.microsoft.com/office/drawing/2014/main" id="{23E78D1C-1316-2D4D-336C-12FE82AC251C}"/>
+              </a:ext>
+            </a:extLst>
+          </p:cNvPr>
+          <p:cNvSpPr/>
+          <p:nvPr/>
+        </p:nvSpPr>
+        <p:spPr>
+          <a:xfrm>
+            <a:off x="7162229" y="1217060"/>
+            <a:ext cx="406400" cy="4152900"/>
+          </a:xfrm>
+          <a:prstGeom prst="rect">
+            <a:avLst/>
+          </a:prstGeom>
+          <a:noFill/>
+          <a:ln>
+            <a:solidFill>
+              <a:srgbClr val="FF0000"/>
+            </a:solidFill>
+          </a:ln>
+        </p:spPr>
+        <p:style>
+          <a:lnRef idx="2">
+            <a:schemeClr val="accent1">
+              <a:shade val="50000"/>
+            </a:schemeClr>
+          </a:lnRef>
+          <a:fillRef idx="1">
+            <a:schemeClr val="accent1"/>
+          </a:fillRef>
+          <a:effectRef idx="0">
+            <a:schemeClr val="accent1"/>
+          </a:effectRef>
+          <a:fontRef idx="minor">
+            <a:schemeClr val="lt1"/>
+          </a:fontRef>
+        </p:style>
+        <p:txBody>
+          <a:bodyPr rtlCol="0" anchor="ctr"/>
+          <a:lstStyle/>
+          <a:p>
+            <a:pPr algn="ctr"/>
+            <a:endParaRPr lang="en-US"/>
+          </a:p>
+        </p:txBody>
+      </p:sp>
     </p:spTree>
     <p:extLst>
       <p:ext uri="{BB962C8B-B14F-4D97-AF65-F5344CB8AC3E}">
-        <p14:creationId xmlns:p14="http://schemas.microsoft.com/office/powerpoint/2010/main" val="1629727062"/>
+        <p14:creationId xmlns:p14="http://schemas.microsoft.com/office/powerpoint/2010/main" val="4221457052"/>
       </p:ext>
     </p:extLst>
   </p:cSld>
@@ -4149,17 +5763,19 @@
         </p:nvSpPr>
         <p:spPr>
           <a:xfrm>
-            <a:off x="838200" y="1253331"/>
-            <a:ext cx="10515600" cy="4351338"/>
+            <a:off x="838200" y="667820"/>
+            <a:ext cx="10515600" cy="5691883"/>
           </a:xfrm>
         </p:spPr>
         <p:txBody>
-          <a:bodyPr/>
+          <a:bodyPr>
+            <a:normAutofit/>
+          </a:bodyPr>
           <a:lstStyle/>
           <a:p>
             <a:r>
               <a:rPr lang="es-ES" dirty="0" err="1"/>
-              <a:t>For</a:t>
+              <a:t>Most</a:t>
             </a:r>
             <a:r>
               <a:rPr lang="es-ES" dirty="0"/>
@@ -4167,7 +5783,7 @@
             </a:r>
             <a:r>
               <a:rPr lang="es-ES" dirty="0" err="1"/>
-              <a:t>most</a:t>
+              <a:t>of</a:t>
             </a:r>
             <a:r>
               <a:rPr lang="es-ES" dirty="0"/>
@@ -4175,7 +5791,7 @@
             </a:r>
             <a:r>
               <a:rPr lang="es-ES" dirty="0" err="1"/>
-              <a:t>of</a:t>
+              <a:t>the</a:t>
             </a:r>
             <a:r>
               <a:rPr lang="es-ES" dirty="0"/>
@@ -4183,7 +5799,7 @@
             </a:r>
             <a:r>
               <a:rPr lang="es-ES" dirty="0" err="1"/>
-              <a:t>the</a:t>
+              <a:t>vegetation</a:t>
             </a:r>
             <a:r>
               <a:rPr lang="es-ES" dirty="0"/>
@@ -4191,7 +5807,15 @@
             </a:r>
             <a:r>
               <a:rPr lang="es-ES" dirty="0" err="1"/>
-              <a:t>there’s</a:t>
+              <a:t>have</a:t>
+            </a:r>
+            <a:r>
+              <a:rPr lang="es-ES" dirty="0"/>
+              <a:t> non-</a:t>
+            </a:r>
+            <a:r>
+              <a:rPr lang="es-ES" dirty="0" err="1"/>
+              <a:t>parametric</a:t>
             </a:r>
             <a:r>
               <a:rPr lang="es-ES" dirty="0"/>
@@ -4199,7 +5823,7 @@
             </a:r>
             <a:r>
               <a:rPr lang="es-ES" dirty="0" err="1"/>
-              <a:t>either</a:t>
+              <a:t>distributions</a:t>
             </a:r>
             <a:r>
               <a:rPr lang="es-ES" dirty="0"/>
@@ -4207,7 +5831,7 @@
             </a:r>
             <a:r>
               <a:rPr lang="es-ES" dirty="0" err="1"/>
-              <a:t>heteroscedasticity</a:t>
+              <a:t>or</a:t>
             </a:r>
             <a:r>
               <a:rPr lang="es-ES" dirty="0"/>
@@ -4215,37 +5839,76 @@
             </a:r>
             <a:r>
               <a:rPr lang="es-ES" dirty="0" err="1"/>
-              <a:t>or</a:t>
+              <a:t>grups</a:t>
             </a:r>
             <a:r>
               <a:rPr lang="es-ES" dirty="0"/>
-              <a:t> non-</a:t>
+              <a:t> are </a:t>
             </a:r>
             <a:r>
               <a:rPr lang="es-ES" dirty="0" err="1"/>
-              <a:t>normality</a:t>
+              <a:t>heteroscedastic</a:t>
             </a:r>
             <a:r>
               <a:rPr lang="es-ES" dirty="0"/>
-              <a:t>, </a:t>
-            </a:r>
-            <a:r>
-              <a:rPr lang="es-ES" dirty="0" err="1"/>
-              <a:t>or</a:t>
-            </a:r>
-            <a:r>
-              <a:rPr lang="es-ES" dirty="0"/>
-              <a:t> </a:t>
-            </a:r>
-            <a:r>
-              <a:rPr lang="es-ES" dirty="0" err="1"/>
-              <a:t>both</a:t>
-            </a:r>
-            <a:r>
-              <a:rPr lang="es-ES" dirty="0"/>
-              <a:t>.</a:t>
-            </a:r>
-            <a:endParaRPr lang="en-US" dirty="0"/>
+              <a:t>. </a:t>
+            </a:r>
+          </a:p>
+          <a:p>
+            <a:pPr marL="0" indent="0">
+              <a:buNone/>
+            </a:pPr>
+            <a:endParaRPr lang="es-ES" dirty="0">
+              <a:sym typeface="Wingdings" panose="05000000000000000000" pitchFamily="2" charset="2"/>
+            </a:endParaRPr>
+          </a:p>
+          <a:p>
+            <a:pPr marL="0" indent="0">
+              <a:buNone/>
+            </a:pPr>
+            <a:r>
+              <a:rPr lang="es-ES" dirty="0">
+                <a:sym typeface="Wingdings" panose="05000000000000000000" pitchFamily="2" charset="2"/>
+              </a:rPr>
+              <a:t> </a:t>
+            </a:r>
+            <a:r>
+              <a:rPr lang="en-US" dirty="0">
+                <a:sym typeface="Wingdings" panose="05000000000000000000" pitchFamily="2" charset="2"/>
+              </a:rPr>
+              <a:t>Not possible to do ANOVA to assess dens, var and dens*var effects</a:t>
+            </a:r>
+          </a:p>
+          <a:p>
+            <a:pPr marL="0" indent="0">
+              <a:buNone/>
+            </a:pPr>
+            <a:endParaRPr lang="en-US" dirty="0">
+              <a:sym typeface="Wingdings" panose="05000000000000000000" pitchFamily="2" charset="2"/>
+            </a:endParaRPr>
+          </a:p>
+          <a:p>
+            <a:pPr marL="0" indent="0">
+              <a:buNone/>
+            </a:pPr>
+            <a:r>
+              <a:rPr lang="en-US" dirty="0">
+                <a:sym typeface="Wingdings" panose="05000000000000000000" pitchFamily="2" charset="2"/>
+              </a:rPr>
+              <a:t>Assessment of dens-</a:t>
+            </a:r>
+            <a:r>
+              <a:rPr lang="en-US" dirty="0" err="1">
+                <a:sym typeface="Wingdings" panose="05000000000000000000" pitchFamily="2" charset="2"/>
+              </a:rPr>
+              <a:t>VegIndex</a:t>
+            </a:r>
+            <a:r>
+              <a:rPr lang="en-US" dirty="0">
+                <a:sym typeface="Wingdings" panose="05000000000000000000" pitchFamily="2" charset="2"/>
+              </a:rPr>
+              <a:t> relationship:</a:t>
+            </a:r>
           </a:p>
           <a:p>
             <a:pPr>
@@ -4256,51 +5919,74 @@
               <a:rPr lang="en-US" dirty="0">
                 <a:sym typeface="Wingdings" panose="05000000000000000000" pitchFamily="2" charset="2"/>
               </a:rPr>
-              <a:t>Not possible to do ANOVA to assess dens, var and dens*var effects</a:t>
-            </a:r>
-          </a:p>
-          <a:p>
-            <a:pPr marL="0" indent="0">
-              <a:buNone/>
+              <a:t>Spearman’s Rank correlation (non-parametric)</a:t>
+            </a:r>
+          </a:p>
+          <a:p>
+            <a:pPr>
+              <a:buFont typeface="Wingdings" panose="05000000000000000000" pitchFamily="2" charset="2"/>
+              <a:buChar char="à"/>
+            </a:pPr>
+            <a:r>
+              <a:rPr lang="en-US" dirty="0">
+                <a:sym typeface="Wingdings" panose="05000000000000000000" pitchFamily="2" charset="2"/>
+              </a:rPr>
+              <a:t> PCA</a:t>
+            </a:r>
+          </a:p>
+          <a:p>
+            <a:pPr>
+              <a:buFont typeface="Wingdings" panose="05000000000000000000" pitchFamily="2" charset="2"/>
+              <a:buChar char="à"/>
+            </a:pPr>
+            <a:r>
+              <a:rPr lang="en-US" dirty="0">
+                <a:sym typeface="Wingdings" panose="05000000000000000000" pitchFamily="2" charset="2"/>
+              </a:rPr>
+              <a:t> Decision trees:</a:t>
+            </a:r>
+          </a:p>
+          <a:p>
+            <a:pPr lvl="1"/>
+            <a:r>
+              <a:rPr lang="en-US" dirty="0">
+                <a:sym typeface="Wingdings" panose="05000000000000000000" pitchFamily="2" charset="2"/>
+              </a:rPr>
+              <a:t>Classification CART trees</a:t>
+            </a:r>
+          </a:p>
+          <a:p>
+            <a:pPr lvl="1"/>
+            <a:r>
+              <a:rPr lang="en-US" dirty="0">
+                <a:sym typeface="Wingdings" panose="05000000000000000000" pitchFamily="2" charset="2"/>
+              </a:rPr>
+              <a:t>Conditional inference trees </a:t>
+            </a:r>
+          </a:p>
+          <a:p>
+            <a:pPr lvl="1"/>
+            <a:r>
+              <a:rPr lang="en-US" dirty="0">
+                <a:sym typeface="Wingdings" panose="05000000000000000000" pitchFamily="2" charset="2"/>
+              </a:rPr>
+              <a:t>Random forests</a:t>
+            </a:r>
+          </a:p>
+          <a:p>
+            <a:pPr lvl="1"/>
+            <a:endParaRPr lang="en-US" dirty="0">
+              <a:sym typeface="Wingdings" panose="05000000000000000000" pitchFamily="2" charset="2"/>
+            </a:endParaRPr>
+          </a:p>
+          <a:p>
+            <a:pPr>
+              <a:buFont typeface="Wingdings" panose="05000000000000000000" pitchFamily="2" charset="2"/>
+              <a:buChar char="à"/>
             </a:pPr>
             <a:endParaRPr lang="en-US" dirty="0">
               <a:sym typeface="Wingdings" panose="05000000000000000000" pitchFamily="2" charset="2"/>
             </a:endParaRPr>
-          </a:p>
-          <a:p>
-            <a:pPr marL="0" indent="0">
-              <a:buNone/>
-            </a:pPr>
-            <a:r>
-              <a:rPr lang="en-US" dirty="0">
-                <a:sym typeface="Wingdings" panose="05000000000000000000" pitchFamily="2" charset="2"/>
-              </a:rPr>
-              <a:t>Assessment of dens-</a:t>
-            </a:r>
-            <a:r>
-              <a:rPr lang="en-US" dirty="0" err="1">
-                <a:sym typeface="Wingdings" panose="05000000000000000000" pitchFamily="2" charset="2"/>
-              </a:rPr>
-              <a:t>VegIndex</a:t>
-            </a:r>
-            <a:r>
-              <a:rPr lang="en-US" dirty="0">
-                <a:sym typeface="Wingdings" panose="05000000000000000000" pitchFamily="2" charset="2"/>
-              </a:rPr>
-              <a:t> relationship:</a:t>
-            </a:r>
-          </a:p>
-          <a:p>
-            <a:pPr>
-              <a:buFont typeface="Wingdings" panose="05000000000000000000" pitchFamily="2" charset="2"/>
-              <a:buChar char="à"/>
-            </a:pPr>
-            <a:r>
-              <a:rPr lang="en-US" dirty="0">
-                <a:sym typeface="Wingdings" panose="05000000000000000000" pitchFamily="2" charset="2"/>
-              </a:rPr>
-              <a:t>Spearman’s Rank correlation (nonparametric)</a:t>
-            </a:r>
           </a:p>
         </p:txBody>
       </p:sp>
@@ -5074,7 +6760,7 @@
           <p:cNvPr id="2" name="Title 1">
             <a:extLst>
               <a:ext uri="{FF2B5EF4-FFF2-40B4-BE49-F238E27FC236}">
-                <a16:creationId xmlns:a16="http://schemas.microsoft.com/office/drawing/2014/main" id="{9436E8AB-C561-2FCA-0265-5CB6416C4D16}"/>
+                <a16:creationId xmlns:a16="http://schemas.microsoft.com/office/drawing/2014/main" id="{C40AFC7F-5EA5-87CD-EEF2-6BDE715C738D}"/>
               </a:ext>
             </a:extLst>
           </p:cNvPr>
@@ -5091,202 +6777,124 @@
           <a:lstStyle/>
           <a:p>
             <a:r>
-              <a:rPr lang="es-ES" b="1" dirty="0" err="1"/>
-              <a:t>Random</a:t>
-            </a:r>
-            <a:r>
-              <a:rPr lang="es-ES" b="1" dirty="0"/>
-              <a:t> </a:t>
-            </a:r>
-            <a:r>
-              <a:rPr lang="es-ES" b="1" dirty="0" err="1"/>
-              <a:t>Forests</a:t>
-            </a:r>
-            <a:endParaRPr lang="en-US" b="1" dirty="0"/>
-          </a:p>
-        </p:txBody>
-      </p:sp>
-      <p:pic>
-        <p:nvPicPr>
-          <p:cNvPr id="8" name="Picture 7">
-            <a:extLst>
-              <a:ext uri="{FF2B5EF4-FFF2-40B4-BE49-F238E27FC236}">
-                <a16:creationId xmlns:a16="http://schemas.microsoft.com/office/drawing/2014/main" id="{22DB82C1-AB4C-C75A-4F6A-4867AD100141}"/>
-              </a:ext>
-            </a:extLst>
-          </p:cNvPr>
-          <p:cNvPicPr>
-            <a:picLocks noChangeAspect="1"/>
-          </p:cNvPicPr>
-          <p:nvPr/>
-        </p:nvPicPr>
-        <p:blipFill rotWithShape="1">
-          <a:blip r:embed="rId2"/>
-          <a:srcRect b="70750"/>
-          <a:stretch/>
-        </p:blipFill>
+              <a:rPr lang="en-US" b="1" dirty="0"/>
+              <a:t>Classification</a:t>
+            </a:r>
+            <a:endParaRPr lang="en-US" dirty="0"/>
+          </a:p>
+        </p:txBody>
+      </p:sp>
+      <p:sp>
+        <p:nvSpPr>
+          <p:cNvPr id="4" name="Content Placeholder 2">
+            <a:extLst>
+              <a:ext uri="{FF2B5EF4-FFF2-40B4-BE49-F238E27FC236}">
+                <a16:creationId xmlns:a16="http://schemas.microsoft.com/office/drawing/2014/main" id="{169428E1-00B6-1985-2387-D774DAA298E8}"/>
+              </a:ext>
+            </a:extLst>
+          </p:cNvPr>
+          <p:cNvSpPr>
+            <a:spLocks noGrp="1"/>
+          </p:cNvSpPr>
+          <p:nvPr>
+            <p:ph idx="1"/>
+          </p:nvPr>
+        </p:nvSpPr>
         <p:spPr>
           <a:xfrm>
-            <a:off x="1144322" y="3554948"/>
-            <a:ext cx="4086225" cy="2261136"/>
+            <a:off x="838200" y="1528175"/>
+            <a:ext cx="10515600" cy="4831528"/>
           </a:xfrm>
-          <a:prstGeom prst="rect">
-            <a:avLst/>
-          </a:prstGeom>
         </p:spPr>
-      </p:pic>
-      <p:sp>
-        <p:nvSpPr>
-          <p:cNvPr id="11" name="TextBox 10">
-            <a:extLst>
-              <a:ext uri="{FF2B5EF4-FFF2-40B4-BE49-F238E27FC236}">
-                <a16:creationId xmlns:a16="http://schemas.microsoft.com/office/drawing/2014/main" id="{260FD1F0-D4F9-64B8-21EE-35A657542C55}"/>
-              </a:ext>
-            </a:extLst>
-          </p:cNvPr>
-          <p:cNvSpPr txBox="1"/>
-          <p:nvPr/>
-        </p:nvSpPr>
-        <p:spPr>
-          <a:xfrm>
-            <a:off x="9618661" y="86510"/>
-            <a:ext cx="2579159" cy="707886"/>
-          </a:xfrm>
-          <a:prstGeom prst="rect">
-            <a:avLst/>
-          </a:prstGeom>
-          <a:noFill/>
-        </p:spPr>
-        <p:txBody>
-          <a:bodyPr wrap="square" rtlCol="0">
-            <a:spAutoFit/>
+        <p:txBody>
+          <a:bodyPr>
+            <a:normAutofit fontScale="85000" lnSpcReduction="10000"/>
           </a:bodyPr>
           <a:lstStyle/>
           <a:p>
-            <a:r>
-              <a:rPr lang="es-ES" sz="4000" u="sng" dirty="0"/>
-              <a:t>15m</a:t>
-            </a:r>
-            <a:r>
-              <a:rPr lang="es-ES" sz="4000" dirty="0"/>
-              <a:t> 03-09</a:t>
-            </a:r>
-            <a:endParaRPr lang="en-US" sz="4000" dirty="0"/>
-          </a:p>
-        </p:txBody>
-      </p:sp>
-      <p:pic>
-        <p:nvPicPr>
-          <p:cNvPr id="14" name="Picture 13">
-            <a:extLst>
-              <a:ext uri="{FF2B5EF4-FFF2-40B4-BE49-F238E27FC236}">
-                <a16:creationId xmlns:a16="http://schemas.microsoft.com/office/drawing/2014/main" id="{C79C25F6-0623-2931-B39E-0CB52372A240}"/>
-              </a:ext>
-            </a:extLst>
-          </p:cNvPr>
-          <p:cNvPicPr>
-            <a:picLocks noChangeAspect="1"/>
-          </p:cNvPicPr>
-          <p:nvPr/>
-        </p:nvPicPr>
-        <p:blipFill rotWithShape="1">
-          <a:blip r:embed="rId3"/>
-          <a:srcRect t="29297"/>
-          <a:stretch/>
-        </p:blipFill>
-        <p:spPr>
-          <a:xfrm>
-            <a:off x="6573309" y="1191161"/>
-            <a:ext cx="5086350" cy="4727575"/>
-          </a:xfrm>
-          <a:prstGeom prst="rect">
-            <a:avLst/>
-          </a:prstGeom>
-        </p:spPr>
-      </p:pic>
-      <p:sp>
-        <p:nvSpPr>
-          <p:cNvPr id="15" name="TextBox 14">
-            <a:extLst>
-              <a:ext uri="{FF2B5EF4-FFF2-40B4-BE49-F238E27FC236}">
-                <a16:creationId xmlns:a16="http://schemas.microsoft.com/office/drawing/2014/main" id="{4AC1055D-C3A9-1E1F-3930-E7CF498C7519}"/>
-              </a:ext>
-            </a:extLst>
-          </p:cNvPr>
-          <p:cNvSpPr txBox="1"/>
-          <p:nvPr/>
-        </p:nvSpPr>
-        <p:spPr>
-          <a:xfrm>
-            <a:off x="838200" y="1507638"/>
-            <a:ext cx="3911600" cy="1477328"/>
-          </a:xfrm>
-          <a:prstGeom prst="rect">
-            <a:avLst/>
-          </a:prstGeom>
-          <a:noFill/>
-        </p:spPr>
-        <p:txBody>
-          <a:bodyPr wrap="square" rtlCol="0">
-            <a:spAutoFit/>
-          </a:bodyPr>
-          <a:lstStyle/>
-          <a:p>
-            <a:r>
-              <a:rPr lang="es-ES" dirty="0"/>
-              <a:t>PC1 &amp; PC2</a:t>
-            </a:r>
-          </a:p>
-          <a:p>
-            <a:endParaRPr lang="es-ES" dirty="0"/>
-          </a:p>
-          <a:p>
-            <a:r>
-              <a:rPr lang="es-ES" dirty="0"/>
-              <a:t>70% </a:t>
-            </a:r>
-            <a:r>
-              <a:rPr lang="es-ES" dirty="0" err="1"/>
-              <a:t>train</a:t>
-            </a:r>
-            <a:r>
-              <a:rPr lang="es-ES" dirty="0"/>
-              <a:t> 30% test </a:t>
-            </a:r>
-            <a:r>
-              <a:rPr lang="es-ES" dirty="0" err="1"/>
-              <a:t>random</a:t>
-            </a:r>
-            <a:r>
-              <a:rPr lang="es-ES" dirty="0"/>
-              <a:t> </a:t>
-            </a:r>
-            <a:r>
-              <a:rPr lang="es-ES" dirty="0" err="1"/>
-              <a:t>split</a:t>
-            </a:r>
-            <a:endParaRPr lang="es-ES" dirty="0"/>
-          </a:p>
-          <a:p>
-            <a:endParaRPr lang="es-ES" dirty="0"/>
-          </a:p>
-          <a:p>
-            <a:r>
-              <a:rPr lang="es-ES" dirty="0"/>
-              <a:t>10000 </a:t>
-            </a:r>
-            <a:r>
-              <a:rPr lang="es-ES" dirty="0" err="1"/>
-              <a:t>trees</a:t>
-            </a:r>
-            <a:endParaRPr lang="en-US" dirty="0"/>
+            <a:pPr>
+              <a:lnSpc>
+                <a:spcPct val="200000"/>
+              </a:lnSpc>
+            </a:pPr>
+            <a:r>
+              <a:rPr lang="en-US" dirty="0">
+                <a:sym typeface="Wingdings" panose="05000000000000000000" pitchFamily="2" charset="2"/>
+              </a:rPr>
+              <a:t>Data partition:</a:t>
+            </a:r>
+          </a:p>
+          <a:p>
+            <a:pPr lvl="1">
+              <a:lnSpc>
+                <a:spcPct val="200000"/>
+              </a:lnSpc>
+            </a:pPr>
+            <a:r>
+              <a:rPr lang="en-US" dirty="0">
+                <a:sym typeface="Wingdings" panose="05000000000000000000" pitchFamily="2" charset="2"/>
+              </a:rPr>
+              <a:t>Per date and altitude, separating data per flight</a:t>
+            </a:r>
+          </a:p>
+          <a:p>
+            <a:pPr lvl="1">
+              <a:lnSpc>
+                <a:spcPct val="200000"/>
+              </a:lnSpc>
+            </a:pPr>
+            <a:r>
+              <a:rPr lang="en-US" dirty="0">
+                <a:sym typeface="Wingdings" panose="05000000000000000000" pitchFamily="2" charset="2"/>
+              </a:rPr>
+              <a:t>Per date, combining data taken in different flights, including flight Altitude as predictor in the model</a:t>
+            </a:r>
+          </a:p>
+          <a:p>
+            <a:pPr>
+              <a:lnSpc>
+                <a:spcPct val="200000"/>
+              </a:lnSpc>
+            </a:pPr>
+            <a:r>
+              <a:rPr lang="en-US" dirty="0">
+                <a:sym typeface="Wingdings" panose="05000000000000000000" pitchFamily="2" charset="2"/>
+              </a:rPr>
+              <a:t>Model:</a:t>
+            </a:r>
+          </a:p>
+          <a:p>
+            <a:pPr lvl="1">
+              <a:lnSpc>
+                <a:spcPct val="200000"/>
+              </a:lnSpc>
+            </a:pPr>
+            <a:r>
+              <a:rPr lang="en-US" dirty="0">
+                <a:sym typeface="Wingdings" panose="05000000000000000000" pitchFamily="2" charset="2"/>
+              </a:rPr>
+              <a:t>Using raw variables</a:t>
+            </a:r>
+          </a:p>
+          <a:p>
+            <a:pPr lvl="1">
+              <a:lnSpc>
+                <a:spcPct val="200000"/>
+              </a:lnSpc>
+            </a:pPr>
+            <a:r>
+              <a:rPr lang="en-US" dirty="0">
+                <a:sym typeface="Wingdings" panose="05000000000000000000" pitchFamily="2" charset="2"/>
+              </a:rPr>
+              <a:t>Using Principal Components</a:t>
+            </a:r>
           </a:p>
         </p:txBody>
       </p:sp>
     </p:spTree>
     <p:extLst>
       <p:ext uri="{BB962C8B-B14F-4D97-AF65-F5344CB8AC3E}">
-        <p14:creationId xmlns:p14="http://schemas.microsoft.com/office/powerpoint/2010/main" val="1422733971"/>
+        <p14:creationId xmlns:p14="http://schemas.microsoft.com/office/powerpoint/2010/main" val="4097966587"/>
       </p:ext>
     </p:extLst>
   </p:cSld>

</xml_diff>

<commit_message>
Added model repetition datasets for ML performance statistics
</commit_message>
<xml_diff>
--- a/outputs/summary.pptx
+++ b/outputs/summary.pptx
@@ -131,7 +131,7 @@
 <file path=ppt/revisionInfo.xml><?xml version="1.0" encoding="utf-8"?>
 <p1510:revInfo xmlns:a="http://schemas.openxmlformats.org/drawingml/2006/main" xmlns:r="http://schemas.openxmlformats.org/officeDocument/2006/relationships" xmlns:p1510="http://schemas.microsoft.com/office/powerpoint/2015/10/main">
   <p1510:revLst>
-    <p1510:client id="{AD861AA3-1B13-4595-854C-9F6C151E35BA}" v="43" dt="2022-11-07T10:25:03.469"/>
+    <p1510:client id="{AD861AA3-1B13-4595-854C-9F6C151E35BA}" v="46" dt="2022-11-07T16:29:48.508"/>
   </p1510:revLst>
 </p1510:revInfo>
 </file>
@@ -141,7 +141,7 @@
   <pc:docChgLst>
     <pc:chgData name="Jauregui Beso, Jara" userId="545a1999-fc67-42e4-bc6e-07b57f946614" providerId="ADAL" clId="{AD861AA3-1B13-4595-854C-9F6C151E35BA}"/>
     <pc:docChg chg="undo custSel addSld delSld modSld sldOrd">
-      <pc:chgData name="Jauregui Beso, Jara" userId="545a1999-fc67-42e4-bc6e-07b57f946614" providerId="ADAL" clId="{AD861AA3-1B13-4595-854C-9F6C151E35BA}" dt="2022-11-07T10:26:05.400" v="1990"/>
+      <pc:chgData name="Jauregui Beso, Jara" userId="545a1999-fc67-42e4-bc6e-07b57f946614" providerId="ADAL" clId="{AD861AA3-1B13-4595-854C-9F6C151E35BA}" dt="2022-11-07T17:01:49.072" v="2666" actId="1076"/>
       <pc:docMkLst>
         <pc:docMk/>
       </pc:docMkLst>
@@ -353,7 +353,7 @@
         </pc:spChg>
       </pc:sldChg>
       <pc:sldChg chg="addSp delSp modSp add mod">
-        <pc:chgData name="Jauregui Beso, Jara" userId="545a1999-fc67-42e4-bc6e-07b57f946614" providerId="ADAL" clId="{AD861AA3-1B13-4595-854C-9F6C151E35BA}" dt="2022-11-07T10:19:20.491" v="1933" actId="20577"/>
+        <pc:chgData name="Jauregui Beso, Jara" userId="545a1999-fc67-42e4-bc6e-07b57f946614" providerId="ADAL" clId="{AD861AA3-1B13-4595-854C-9F6C151E35BA}" dt="2022-11-07T16:29:00.358" v="2379" actId="14100"/>
         <pc:sldMkLst>
           <pc:docMk/>
           <pc:sldMk cId="2327810541" sldId="268"/>
@@ -383,7 +383,7 @@
           </ac:spMkLst>
         </pc:spChg>
         <pc:spChg chg="add mod">
-          <ac:chgData name="Jauregui Beso, Jara" userId="545a1999-fc67-42e4-bc6e-07b57f946614" providerId="ADAL" clId="{AD861AA3-1B13-4595-854C-9F6C151E35BA}" dt="2022-11-07T10:19:20.491" v="1933" actId="20577"/>
+          <ac:chgData name="Jauregui Beso, Jara" userId="545a1999-fc67-42e4-bc6e-07b57f946614" providerId="ADAL" clId="{AD861AA3-1B13-4595-854C-9F6C151E35BA}" dt="2022-11-07T16:29:00.358" v="2379" actId="14100"/>
           <ac:spMkLst>
             <pc:docMk/>
             <pc:sldMk cId="2327810541" sldId="268"/>
@@ -697,14 +697,22 @@
           </ac:picMkLst>
         </pc:picChg>
       </pc:sldChg>
-      <pc:sldChg chg="modSp add mod">
-        <pc:chgData name="Jauregui Beso, Jara" userId="545a1999-fc67-42e4-bc6e-07b57f946614" providerId="ADAL" clId="{AD861AA3-1B13-4595-854C-9F6C151E35BA}" dt="2022-11-07T10:20:20.478" v="1942" actId="113"/>
+      <pc:sldChg chg="addSp modSp add mod">
+        <pc:chgData name="Jauregui Beso, Jara" userId="545a1999-fc67-42e4-bc6e-07b57f946614" providerId="ADAL" clId="{AD861AA3-1B13-4595-854C-9F6C151E35BA}" dt="2022-11-07T17:01:49.072" v="2666" actId="1076"/>
         <pc:sldMkLst>
           <pc:docMk/>
           <pc:sldMk cId="91587047" sldId="275"/>
         </pc:sldMkLst>
+        <pc:spChg chg="add mod">
+          <ac:chgData name="Jauregui Beso, Jara" userId="545a1999-fc67-42e4-bc6e-07b57f946614" providerId="ADAL" clId="{AD861AA3-1B13-4595-854C-9F6C151E35BA}" dt="2022-11-07T16:53:07.026" v="2575" actId="20577"/>
+          <ac:spMkLst>
+            <pc:docMk/>
+            <pc:sldMk cId="91587047" sldId="275"/>
+            <ac:spMk id="3" creationId="{896EB8CE-0ED8-F7D6-D4A0-E278E6C14B60}"/>
+          </ac:spMkLst>
+        </pc:spChg>
         <pc:spChg chg="mod">
-          <ac:chgData name="Jauregui Beso, Jara" userId="545a1999-fc67-42e4-bc6e-07b57f946614" providerId="ADAL" clId="{AD861AA3-1B13-4595-854C-9F6C151E35BA}" dt="2022-11-07T10:20:20.478" v="1942" actId="113"/>
+          <ac:chgData name="Jauregui Beso, Jara" userId="545a1999-fc67-42e4-bc6e-07b57f946614" providerId="ADAL" clId="{AD861AA3-1B13-4595-854C-9F6C151E35BA}" dt="2022-11-07T17:01:49.072" v="2666" actId="1076"/>
           <ac:spMkLst>
             <pc:docMk/>
             <pc:sldMk cId="91587047" sldId="275"/>
@@ -712,7 +720,7 @@
           </ac:spMkLst>
         </pc:spChg>
         <pc:picChg chg="mod modCrop">
-          <ac:chgData name="Jauregui Beso, Jara" userId="545a1999-fc67-42e4-bc6e-07b57f946614" providerId="ADAL" clId="{AD861AA3-1B13-4595-854C-9F6C151E35BA}" dt="2022-11-07T10:17:35.245" v="1883" actId="1076"/>
+          <ac:chgData name="Jauregui Beso, Jara" userId="545a1999-fc67-42e4-bc6e-07b57f946614" providerId="ADAL" clId="{AD861AA3-1B13-4595-854C-9F6C151E35BA}" dt="2022-11-07T16:29:13.399" v="2380" actId="14100"/>
           <ac:picMkLst>
             <pc:docMk/>
             <pc:sldMk cId="91587047" sldId="275"/>
@@ -720,20 +728,44 @@
           </ac:picMkLst>
         </pc:picChg>
       </pc:sldChg>
-      <pc:sldChg chg="modSp add mod">
-        <pc:chgData name="Jauregui Beso, Jara" userId="545a1999-fc67-42e4-bc6e-07b57f946614" providerId="ADAL" clId="{AD861AA3-1B13-4595-854C-9F6C151E35BA}" dt="2022-11-07T10:21:08.782" v="1948" actId="113"/>
+      <pc:sldChg chg="addSp delSp modSp add mod">
+        <pc:chgData name="Jauregui Beso, Jara" userId="545a1999-fc67-42e4-bc6e-07b57f946614" providerId="ADAL" clId="{AD861AA3-1B13-4595-854C-9F6C151E35BA}" dt="2022-11-07T17:01:34.154" v="2664" actId="1076"/>
         <pc:sldMkLst>
           <pc:docMk/>
           <pc:sldMk cId="3817661182" sldId="276"/>
         </pc:sldMkLst>
+        <pc:spChg chg="add mod">
+          <ac:chgData name="Jauregui Beso, Jara" userId="545a1999-fc67-42e4-bc6e-07b57f946614" providerId="ADAL" clId="{AD861AA3-1B13-4595-854C-9F6C151E35BA}" dt="2022-11-07T16:56:01.060" v="2645" actId="21"/>
+          <ac:spMkLst>
+            <pc:docMk/>
+            <pc:sldMk cId="3817661182" sldId="276"/>
+            <ac:spMk id="5" creationId="{FA3D43F3-FE7E-08F1-0F5D-0033A5710F09}"/>
+          </ac:spMkLst>
+        </pc:spChg>
         <pc:spChg chg="mod">
-          <ac:chgData name="Jauregui Beso, Jara" userId="545a1999-fc67-42e4-bc6e-07b57f946614" providerId="ADAL" clId="{AD861AA3-1B13-4595-854C-9F6C151E35BA}" dt="2022-11-07T10:21:08.782" v="1948" actId="113"/>
+          <ac:chgData name="Jauregui Beso, Jara" userId="545a1999-fc67-42e4-bc6e-07b57f946614" providerId="ADAL" clId="{AD861AA3-1B13-4595-854C-9F6C151E35BA}" dt="2022-11-07T17:01:27.165" v="2663" actId="1076"/>
           <ac:spMkLst>
             <pc:docMk/>
             <pc:sldMk cId="3817661182" sldId="276"/>
             <ac:spMk id="11" creationId="{99BAED0E-81C2-C67C-9F14-4EB2793F82AE}"/>
           </ac:spMkLst>
         </pc:spChg>
+        <pc:picChg chg="add mod ord modCrop">
+          <ac:chgData name="Jauregui Beso, Jara" userId="545a1999-fc67-42e4-bc6e-07b57f946614" providerId="ADAL" clId="{AD861AA3-1B13-4595-854C-9F6C151E35BA}" dt="2022-11-07T17:01:34.154" v="2664" actId="1076"/>
+          <ac:picMkLst>
+            <pc:docMk/>
+            <pc:sldMk cId="3817661182" sldId="276"/>
+            <ac:picMk id="4" creationId="{8E0F5223-B016-0819-3514-C38B361166D5}"/>
+          </ac:picMkLst>
+        </pc:picChg>
+        <pc:picChg chg="del">
+          <ac:chgData name="Jauregui Beso, Jara" userId="545a1999-fc67-42e4-bc6e-07b57f946614" providerId="ADAL" clId="{AD861AA3-1B13-4595-854C-9F6C151E35BA}" dt="2022-11-07T15:58:06.490" v="2100" actId="478"/>
+          <ac:picMkLst>
+            <pc:docMk/>
+            <pc:sldMk cId="3817661182" sldId="276"/>
+            <ac:picMk id="9" creationId="{1DD11078-4070-8F15-DFC7-A11CEB60B02A}"/>
+          </ac:picMkLst>
+        </pc:picChg>
       </pc:sldChg>
       <pc:sldChg chg="modSp add mod">
         <pc:chgData name="Jauregui Beso, Jara" userId="545a1999-fc67-42e4-bc6e-07b57f946614" providerId="ADAL" clId="{AD861AA3-1B13-4595-854C-9F6C151E35BA}" dt="2022-11-07T10:21:53.005" v="1952"/>
@@ -917,7 +949,7 @@
           <a:p>
             <a:fld id="{046D3877-9706-4A9A-A778-097DEF198E05}" type="datetimeFigureOut">
               <a:rPr lang="en-US" smtClean="0"/>
-              <a:t>11/3/2022</a:t>
+              <a:t>11/7/2022</a:t>
             </a:fld>
             <a:endParaRPr lang="en-US"/>
           </a:p>
@@ -1115,7 +1147,7 @@
           <a:p>
             <a:fld id="{046D3877-9706-4A9A-A778-097DEF198E05}" type="datetimeFigureOut">
               <a:rPr lang="en-US" smtClean="0"/>
-              <a:t>11/3/2022</a:t>
+              <a:t>11/7/2022</a:t>
             </a:fld>
             <a:endParaRPr lang="en-US"/>
           </a:p>
@@ -1323,7 +1355,7 @@
           <a:p>
             <a:fld id="{046D3877-9706-4A9A-A778-097DEF198E05}" type="datetimeFigureOut">
               <a:rPr lang="en-US" smtClean="0"/>
-              <a:t>11/3/2022</a:t>
+              <a:t>11/7/2022</a:t>
             </a:fld>
             <a:endParaRPr lang="en-US"/>
           </a:p>
@@ -1521,7 +1553,7 @@
           <a:p>
             <a:fld id="{046D3877-9706-4A9A-A778-097DEF198E05}" type="datetimeFigureOut">
               <a:rPr lang="en-US" smtClean="0"/>
-              <a:t>11/3/2022</a:t>
+              <a:t>11/7/2022</a:t>
             </a:fld>
             <a:endParaRPr lang="en-US"/>
           </a:p>
@@ -1796,7 +1828,7 @@
           <a:p>
             <a:fld id="{046D3877-9706-4A9A-A778-097DEF198E05}" type="datetimeFigureOut">
               <a:rPr lang="en-US" smtClean="0"/>
-              <a:t>11/3/2022</a:t>
+              <a:t>11/7/2022</a:t>
             </a:fld>
             <a:endParaRPr lang="en-US"/>
           </a:p>
@@ -2061,7 +2093,7 @@
           <a:p>
             <a:fld id="{046D3877-9706-4A9A-A778-097DEF198E05}" type="datetimeFigureOut">
               <a:rPr lang="en-US" smtClean="0"/>
-              <a:t>11/3/2022</a:t>
+              <a:t>11/7/2022</a:t>
             </a:fld>
             <a:endParaRPr lang="en-US"/>
           </a:p>
@@ -2473,7 +2505,7 @@
           <a:p>
             <a:fld id="{046D3877-9706-4A9A-A778-097DEF198E05}" type="datetimeFigureOut">
               <a:rPr lang="en-US" smtClean="0"/>
-              <a:t>11/3/2022</a:t>
+              <a:t>11/7/2022</a:t>
             </a:fld>
             <a:endParaRPr lang="en-US"/>
           </a:p>
@@ -2614,7 +2646,7 @@
           <a:p>
             <a:fld id="{046D3877-9706-4A9A-A778-097DEF198E05}" type="datetimeFigureOut">
               <a:rPr lang="en-US" smtClean="0"/>
-              <a:t>11/3/2022</a:t>
+              <a:t>11/7/2022</a:t>
             </a:fld>
             <a:endParaRPr lang="en-US"/>
           </a:p>
@@ -2727,7 +2759,7 @@
           <a:p>
             <a:fld id="{046D3877-9706-4A9A-A778-097DEF198E05}" type="datetimeFigureOut">
               <a:rPr lang="en-US" smtClean="0"/>
-              <a:t>11/3/2022</a:t>
+              <a:t>11/7/2022</a:t>
             </a:fld>
             <a:endParaRPr lang="en-US"/>
           </a:p>
@@ -3038,7 +3070,7 @@
           <a:p>
             <a:fld id="{046D3877-9706-4A9A-A778-097DEF198E05}" type="datetimeFigureOut">
               <a:rPr lang="en-US" smtClean="0"/>
-              <a:t>11/3/2022</a:t>
+              <a:t>11/7/2022</a:t>
             </a:fld>
             <a:endParaRPr lang="en-US"/>
           </a:p>
@@ -3326,7 +3358,7 @@
           <a:p>
             <a:fld id="{046D3877-9706-4A9A-A778-097DEF198E05}" type="datetimeFigureOut">
               <a:rPr lang="en-US" smtClean="0"/>
-              <a:t>11/3/2022</a:t>
+              <a:t>11/7/2022</a:t>
             </a:fld>
             <a:endParaRPr lang="en-US"/>
           </a:p>
@@ -3567,7 +3599,7 @@
           <a:p>
             <a:fld id="{046D3877-9706-4A9A-A778-097DEF198E05}" type="datetimeFigureOut">
               <a:rPr lang="en-US" smtClean="0"/>
-              <a:t>11/3/2022</a:t>
+              <a:t>11/7/2022</a:t>
             </a:fld>
             <a:endParaRPr lang="en-US"/>
           </a:p>
@@ -4124,7 +4156,7 @@
         <p:spPr>
           <a:xfrm>
             <a:off x="693604" y="1788013"/>
-            <a:ext cx="9066621" cy="1852815"/>
+            <a:ext cx="10251204" cy="1852815"/>
           </a:xfrm>
           <a:prstGeom prst="rect">
             <a:avLst/>
@@ -4144,7 +4176,7 @@
             </a:pPr>
             <a:r>
               <a:rPr lang="en-US" sz="2000" b="1" dirty="0"/>
-              <a:t>10-fold Cross-Validation with 10 repeats</a:t>
+              <a:t>10-fold Cross-Validation with 10 repeats, n = 10 (results averaged over 10 different models)</a:t>
             </a:r>
           </a:p>
           <a:p>
@@ -4232,8 +4264,8 @@
         </p:blipFill>
         <p:spPr>
           <a:xfrm>
-            <a:off x="4846983" y="136189"/>
-            <a:ext cx="7345017" cy="6030425"/>
+            <a:off x="5029200" y="136189"/>
+            <a:ext cx="7162800" cy="6030425"/>
           </a:xfrm>
           <a:prstGeom prst="rect">
             <a:avLst/>
@@ -4296,8 +4328,8 @@
         </p:nvSpPr>
         <p:spPr>
           <a:xfrm>
-            <a:off x="417443" y="1788013"/>
-            <a:ext cx="5257800" cy="2468368"/>
+            <a:off x="408113" y="2114274"/>
+            <a:ext cx="5059626" cy="2468368"/>
           </a:xfrm>
           <a:prstGeom prst="rect">
             <a:avLst/>
@@ -4321,14 +4353,9 @@
             </a:r>
           </a:p>
           <a:p>
-            <a:pPr>
-              <a:lnSpc>
-                <a:spcPct val="200000"/>
-              </a:lnSpc>
-            </a:pPr>
             <a:r>
               <a:rPr lang="en-US" sz="2000" dirty="0"/>
-              <a:t>Best performance : 03-22 at 50m w/o PC</a:t>
+              <a:t>Best performance : 03-22 at 50m with or w/o PC (p-value = 1)</a:t>
             </a:r>
           </a:p>
           <a:p>
@@ -4341,7 +4368,7 @@
             </a:pPr>
             <a:r>
               <a:rPr lang="en-US" sz="2000" dirty="0"/>
-              <a:t>Mean accuracy: 88 % (</a:t>
+              <a:t>Mean accuracy: 87 % (</a:t>
             </a:r>
             <a:r>
               <a:rPr lang="en-US" sz="2000" dirty="0" err="1"/>
@@ -4349,7 +4376,7 @@
             </a:r>
             <a:r>
               <a:rPr lang="en-US" sz="2000" dirty="0"/>
-              <a:t>:</a:t>
+              <a:t>: 0. 5%)</a:t>
             </a:r>
           </a:p>
           <a:p>
@@ -4362,7 +4389,7 @@
             </a:pPr>
             <a:r>
               <a:rPr lang="en-US" sz="2000" dirty="0"/>
-              <a:t>Mean Kappa:  84.5 % (</a:t>
+              <a:t>Mean Kappa:  83.1 % (</a:t>
             </a:r>
             <a:r>
               <a:rPr lang="en-US" sz="2000" dirty="0" err="1"/>
@@ -4370,7 +4397,55 @@
             </a:r>
             <a:r>
               <a:rPr lang="en-US" sz="2000" dirty="0"/>
-              <a:t>: 	</a:t>
+              <a:t>: 0. 65%)	</a:t>
+            </a:r>
+          </a:p>
+        </p:txBody>
+      </p:sp>
+      <p:sp>
+        <p:nvSpPr>
+          <p:cNvPr id="3" name="TextBox 2">
+            <a:extLst>
+              <a:ext uri="{FF2B5EF4-FFF2-40B4-BE49-F238E27FC236}">
+                <a16:creationId xmlns:a16="http://schemas.microsoft.com/office/drawing/2014/main" id="{896EB8CE-0ED8-F7D6-D4A0-E278E6C14B60}"/>
+              </a:ext>
+            </a:extLst>
+          </p:cNvPr>
+          <p:cNvSpPr txBox="1"/>
+          <p:nvPr/>
+        </p:nvSpPr>
+        <p:spPr>
+          <a:xfrm>
+            <a:off x="295807" y="6208502"/>
+            <a:ext cx="11600386" cy="568745"/>
+          </a:xfrm>
+          <a:prstGeom prst="rect">
+            <a:avLst/>
+          </a:prstGeom>
+          <a:noFill/>
+        </p:spPr>
+        <p:txBody>
+          <a:bodyPr wrap="square" rtlCol="0">
+            <a:spAutoFit/>
+          </a:bodyPr>
+          <a:lstStyle/>
+          <a:p>
+            <a:pPr>
+              <a:lnSpc>
+                <a:spcPct val="200000"/>
+              </a:lnSpc>
+            </a:pPr>
+            <a:r>
+              <a:rPr lang="en-US" dirty="0"/>
+              <a:t>Contrast second best model 05/04_50m_var_nosplit (accuracy: 78%, </a:t>
+            </a:r>
+            <a:r>
+              <a:rPr lang="en-US" dirty="0" err="1"/>
+              <a:t>sd</a:t>
+            </a:r>
+            <a:r>
+              <a:rPr lang="en-US" dirty="0"/>
+              <a:t>: 0.8%), p-value = 0.0006 (Bonferroni) </a:t>
             </a:r>
           </a:p>
         </p:txBody>
@@ -4407,10 +4482,10 @@
       </p:grpSpPr>
       <p:pic>
         <p:nvPicPr>
-          <p:cNvPr id="9" name="Picture 8" descr="Diagram&#10;&#10;Description automatically generated">
-            <a:extLst>
-              <a:ext uri="{FF2B5EF4-FFF2-40B4-BE49-F238E27FC236}">
-                <a16:creationId xmlns:a16="http://schemas.microsoft.com/office/drawing/2014/main" id="{1DD11078-4070-8F15-DFC7-A11CEB60B02A}"/>
+          <p:cNvPr id="4" name="Picture 3" descr="Diagram&#10;&#10;Description automatically generated">
+            <a:extLst>
+              <a:ext uri="{FF2B5EF4-FFF2-40B4-BE49-F238E27FC236}">
+                <a16:creationId xmlns:a16="http://schemas.microsoft.com/office/drawing/2014/main" id="{8E0F5223-B016-0819-3514-C38B361166D5}"/>
               </a:ext>
             </a:extLst>
           </p:cNvPr>
@@ -4427,13 +4502,13 @@
               </a:ext>
             </a:extLst>
           </a:blip>
-          <a:srcRect l="4323" r="2847" b="9926"/>
+          <a:srcRect r="2026" b="8385"/>
           <a:stretch/>
         </p:blipFill>
         <p:spPr>
           <a:xfrm>
-            <a:off x="4846983" y="136189"/>
-            <a:ext cx="7345017" cy="6030425"/>
+            <a:off x="4542621" y="407994"/>
+            <a:ext cx="7341468" cy="5987556"/>
           </a:xfrm>
           <a:prstGeom prst="rect">
             <a:avLst/>
@@ -4496,8 +4571,8 @@
         </p:nvSpPr>
         <p:spPr>
           <a:xfrm>
-            <a:off x="417443" y="1788013"/>
-            <a:ext cx="5257800" cy="3083921"/>
+            <a:off x="693605" y="1788013"/>
+            <a:ext cx="4826361" cy="4093428"/>
           </a:xfrm>
           <a:prstGeom prst="rect">
             <a:avLst/>
@@ -4510,59 +4585,41 @@
           </a:bodyPr>
           <a:lstStyle/>
           <a:p>
-            <a:pPr>
-              <a:lnSpc>
-                <a:spcPct val="200000"/>
-              </a:lnSpc>
-            </a:pPr>
             <a:r>
               <a:rPr lang="en-US" sz="2000" b="1" dirty="0"/>
               <a:t>2) Trained in 80% of the data, accuracy tested in 20% holdout </a:t>
             </a:r>
           </a:p>
           <a:p>
-            <a:pPr>
-              <a:lnSpc>
-                <a:spcPct val="200000"/>
-              </a:lnSpc>
-            </a:pPr>
+            <a:endParaRPr lang="en-US" sz="2000" b="1" dirty="0"/>
+          </a:p>
+          <a:p>
             <a:r>
               <a:rPr lang="en-US" sz="2000" dirty="0"/>
-              <a:t>Best performance : 03-22 at 50m w/o PC</a:t>
-            </a:r>
+              <a:t>Best performance in holdout set :                 03-09 15 + 30 m with or w/o PC</a:t>
+            </a:r>
+          </a:p>
+          <a:p>
+            <a:endParaRPr lang="en-US" sz="2000" dirty="0"/>
           </a:p>
           <a:p>
             <a:pPr marL="285750" indent="-285750">
-              <a:lnSpc>
-                <a:spcPct val="200000"/>
-              </a:lnSpc>
               <a:buFont typeface="Arial" panose="020B0604020202020204" pitchFamily="34" charset="0"/>
               <a:buChar char="•"/>
             </a:pPr>
             <a:r>
               <a:rPr lang="en-US" sz="2000" dirty="0"/>
-              <a:t>Mean accuracy: 88 % (</a:t>
-            </a:r>
-            <a:r>
-              <a:rPr lang="en-US" sz="2000" dirty="0" err="1"/>
-              <a:t>sd</a:t>
-            </a:r>
-            <a:r>
-              <a:rPr lang="en-US" sz="2000" dirty="0"/>
-              <a:t>:</a:t>
-            </a:r>
-          </a:p>
-          <a:p>
-            <a:pPr marL="285750" indent="-285750">
-              <a:lnSpc>
-                <a:spcPct val="200000"/>
-              </a:lnSpc>
+              <a:t>Mean accuracy: </a:t>
+            </a:r>
+          </a:p>
+          <a:p>
+            <a:pPr marL="742950" lvl="1" indent="-285750">
               <a:buFont typeface="Arial" panose="020B0604020202020204" pitchFamily="34" charset="0"/>
               <a:buChar char="•"/>
             </a:pPr>
             <a:r>
               <a:rPr lang="en-US" sz="2000" dirty="0"/>
-              <a:t>Mean Kappa:  84.5 % (</a:t>
+              <a:t>Trained: 66.29% (</a:t>
             </a:r>
             <a:r>
               <a:rPr lang="en-US" sz="2000" dirty="0" err="1"/>
@@ -4570,7 +4627,110 @@
             </a:r>
             <a:r>
               <a:rPr lang="en-US" sz="2000" dirty="0"/>
-              <a:t>: 	</a:t>
+              <a:t>: 2.9 %)</a:t>
+            </a:r>
+          </a:p>
+          <a:p>
+            <a:pPr marL="742950" lvl="1" indent="-285750">
+              <a:buFont typeface="Arial" panose="020B0604020202020204" pitchFamily="34" charset="0"/>
+              <a:buChar char="•"/>
+            </a:pPr>
+            <a:r>
+              <a:rPr lang="en-US" sz="2000" dirty="0"/>
+              <a:t>Tested: 70.83 % (sd:10.4%)</a:t>
+            </a:r>
+          </a:p>
+          <a:p>
+            <a:pPr lvl="1"/>
+            <a:endParaRPr lang="en-US" sz="2000" dirty="0"/>
+          </a:p>
+          <a:p>
+            <a:pPr marL="285750" indent="-285750">
+              <a:buFont typeface="Arial" panose="020B0604020202020204" pitchFamily="34" charset="0"/>
+              <a:buChar char="•"/>
+            </a:pPr>
+            <a:r>
+              <a:rPr lang="en-US" sz="2000" dirty="0"/>
+              <a:t>Mean Kappa:</a:t>
+            </a:r>
+          </a:p>
+          <a:p>
+            <a:pPr marL="742950" lvl="1" indent="-285750">
+              <a:buFont typeface="Arial" panose="020B0604020202020204" pitchFamily="34" charset="0"/>
+              <a:buChar char="•"/>
+            </a:pPr>
+            <a:r>
+              <a:rPr lang="en-US" sz="2000" dirty="0"/>
+              <a:t>Trained: 55.71% (</a:t>
+            </a:r>
+            <a:r>
+              <a:rPr lang="en-US" sz="2000" dirty="0" err="1"/>
+              <a:t>sd</a:t>
+            </a:r>
+            <a:r>
+              <a:rPr lang="en-US" sz="2000" dirty="0"/>
+              <a:t>: 6.82 %)</a:t>
+            </a:r>
+          </a:p>
+          <a:p>
+            <a:pPr marL="742950" lvl="1" indent="-285750">
+              <a:buFont typeface="Arial" panose="020B0604020202020204" pitchFamily="34" charset="0"/>
+              <a:buChar char="•"/>
+            </a:pPr>
+            <a:r>
+              <a:rPr lang="en-US" sz="2000" dirty="0"/>
+              <a:t>Tested: 62.84 % (</a:t>
+            </a:r>
+            <a:r>
+              <a:rPr lang="en-US" sz="2000" dirty="0" err="1"/>
+              <a:t>sd</a:t>
+            </a:r>
+            <a:r>
+              <a:rPr lang="en-US" sz="2000" dirty="0"/>
+              <a:t>: 13.29%) 	</a:t>
+            </a:r>
+          </a:p>
+        </p:txBody>
+      </p:sp>
+      <p:sp>
+        <p:nvSpPr>
+          <p:cNvPr id="5" name="TextBox 4">
+            <a:extLst>
+              <a:ext uri="{FF2B5EF4-FFF2-40B4-BE49-F238E27FC236}">
+                <a16:creationId xmlns:a16="http://schemas.microsoft.com/office/drawing/2014/main" id="{FA3D43F3-FE7E-08F1-0F5D-0033A5710F09}"/>
+              </a:ext>
+            </a:extLst>
+          </p:cNvPr>
+          <p:cNvSpPr txBox="1"/>
+          <p:nvPr/>
+        </p:nvSpPr>
+        <p:spPr>
+          <a:xfrm>
+            <a:off x="220993" y="6160161"/>
+            <a:ext cx="11971007" cy="646331"/>
+          </a:xfrm>
+          <a:prstGeom prst="rect">
+            <a:avLst/>
+          </a:prstGeom>
+          <a:noFill/>
+        </p:spPr>
+        <p:txBody>
+          <a:bodyPr wrap="square" rtlCol="0">
+            <a:spAutoFit/>
+          </a:bodyPr>
+          <a:lstStyle/>
+          <a:p>
+            <a:r>
+              <a:rPr lang="en-US" dirty="0"/>
+              <a:t>Contrast second best model 05/04_50m_var_nosplit (accuracy: 67.5%, </a:t>
+            </a:r>
+            <a:r>
+              <a:rPr lang="en-US" dirty="0" err="1"/>
+              <a:t>sd</a:t>
+            </a:r>
+            <a:r>
+              <a:rPr lang="en-US" dirty="0"/>
+              <a:t>: 13.86%), p-value = 1… no significant differences among algorithm validation accuracies in holdout set</a:t>
             </a:r>
           </a:p>
         </p:txBody>

</xml_diff>